<commit_message>
Started to make changes based on feedback given by Dr.Sekerinski. More to come
</commit_message>
<xml_diff>
--- a/Doc/Poster/poster.pptx
+++ b/Doc/Poster/poster.pptx
@@ -149,6 +149,32 @@
 </p:presentation>
 </file>
 
+<file path=ppt/commentAuthors.xml><?xml version="1.0" encoding="utf-8"?>
+<p:cmAuthorLst xmlns:a="http://schemas.openxmlformats.org/drawingml/2006/main" xmlns:r="http://schemas.openxmlformats.org/officeDocument/2006/relationships" xmlns:p="http://schemas.openxmlformats.org/presentationml/2006/main">
+  <p:cmAuthor id="1" name="Prin Selva" initials="PS" lastIdx="1" clrIdx="0">
+    <p:extLst>
+      <p:ext uri="{19B8F6BF-5375-455C-9EA6-DF929625EA0E}">
+        <p15:presenceInfo xmlns:p15="http://schemas.microsoft.com/office/powerpoint/2012/main" userId="Prin Selva" providerId="None"/>
+      </p:ext>
+    </p:extLst>
+  </p:cmAuthor>
+</p:cmAuthorLst>
+</file>
+
+<file path=ppt/comments/comment1.xml><?xml version="1.0" encoding="utf-8"?>
+<p:cmLst xmlns:a="http://schemas.openxmlformats.org/drawingml/2006/main" xmlns:r="http://schemas.openxmlformats.org/officeDocument/2006/relationships" xmlns:p="http://schemas.openxmlformats.org/presentationml/2006/main">
+  <p:cm authorId="1" dt="2019-04-14T02:43:58.574" idx="1">
+    <p:pos x="10" y="10"/>
+    <p:text/>
+    <p:extLst>
+      <p:ext uri="{C676402C-5697-4E1C-873F-D02D1690AC5C}">
+        <p15:threadingInfo xmlns:p15="http://schemas.microsoft.com/office/powerpoint/2012/main" timeZoneBias="240"/>
+      </p:ext>
+    </p:extLst>
+  </p:cm>
+</p:cmLst>
+</file>
+
 <file path=ppt/handoutMasters/handoutMaster1.xml><?xml version="1.0" encoding="utf-8"?>
 <p:handoutMaster xmlns:a="http://schemas.openxmlformats.org/drawingml/2006/main" xmlns:r="http://schemas.openxmlformats.org/officeDocument/2006/relationships" xmlns:p="http://schemas.openxmlformats.org/presentationml/2006/main">
   <p:cSld>
@@ -237,7 +263,7 @@
           <a:p>
             <a:fld id="{302F586B-0015-43FB-918D-31E1A09780E3}" type="datetimeFigureOut">
               <a:rPr lang="en-US" smtClean="0"/>
-              <a:t>4/12/2019</a:t>
+              <a:t>4/14/2019</a:t>
             </a:fld>
             <a:endParaRPr lang="en-US"/>
           </a:p>
@@ -414,7 +440,7 @@
           <a:p>
             <a:fld id="{7CEAF96C-0DD1-4DCA-AB4B-687076CBD6E7}" type="datetimeFigureOut">
               <a:rPr lang="en-US" smtClean="0"/>
-              <a:t>4/12/2019</a:t>
+              <a:t>4/14/2019</a:t>
             </a:fld>
             <a:endParaRPr lang="en-US"/>
           </a:p>
@@ -737,7 +763,59 @@
             </a:defPPr>
           </a:lstStyle>
           <a:p>
-            <a:endParaRPr lang="en-US"/>
+            <a:endParaRPr lang="en-US" dirty="0"/>
+          </a:p>
+          <a:p>
+            <a:r>
+              <a:rPr lang="en-US" dirty="0"/>
+              <a:t>Changes Based on Feedback:</a:t>
+            </a:r>
+          </a:p>
+          <a:p>
+            <a:r>
+              <a:rPr lang="en-US" dirty="0"/>
+              <a:t>- Address Bar removed from title header</a:t>
+            </a:r>
+          </a:p>
+          <a:p>
+            <a:r>
+              <a:rPr lang="en-US" dirty="0"/>
+              <a:t>- Poster was put through </a:t>
+            </a:r>
+            <a:r>
+              <a:rPr lang="en-US" dirty="0" err="1"/>
+              <a:t>Gramarly</a:t>
+            </a:r>
+            <a:r>
+              <a:rPr lang="en-US" dirty="0"/>
+              <a:t>. Proof Read. </a:t>
+            </a:r>
+          </a:p>
+          <a:p>
+            <a:r>
+              <a:rPr lang="en-US" dirty="0"/>
+              <a:t>- Section for </a:t>
+            </a:r>
+            <a:r>
+              <a:rPr lang="en-US" dirty="0" err="1"/>
+              <a:t>Developement</a:t>
+            </a:r>
+            <a:r>
+              <a:rPr lang="en-US" dirty="0"/>
+              <a:t> Stats was Added</a:t>
+            </a:r>
+          </a:p>
+          <a:p>
+            <a:r>
+              <a:rPr lang="en-US" dirty="0"/>
+              <a:t>- Section for "Conclusion Next Steps" was added to define our experience</a:t>
+            </a:r>
+          </a:p>
+          <a:p>
+            <a:r>
+              <a:rPr lang="en-US" dirty="0"/>
+              <a:t>- Readme Updated : Need to discuss with TA's to ensure that modifications are visible	</a:t>
+            </a:r>
           </a:p>
         </p:txBody>
       </p:sp>
@@ -1153,7 +1231,7 @@
           <a:p>
             <a:fld id="{1D3EE5B7-680E-44FF-962F-3113FAB5030E}" type="datetimeFigureOut">
               <a:rPr lang="en-US" smtClean="0"/>
-              <a:t>4/12/2019</a:t>
+              <a:t>4/14/2019</a:t>
             </a:fld>
             <a:endParaRPr lang="en-US"/>
           </a:p>
@@ -1352,7 +1430,7 @@
           <a:p>
             <a:fld id="{1D3EE5B7-680E-44FF-962F-3113FAB5030E}" type="datetimeFigureOut">
               <a:rPr lang="en-US" smtClean="0"/>
-              <a:t>4/12/2019</a:t>
+              <a:t>4/14/2019</a:t>
             </a:fld>
             <a:endParaRPr lang="en-US"/>
           </a:p>
@@ -1541,7 +1619,7 @@
           <a:p>
             <a:fld id="{1D3EE5B7-680E-44FF-962F-3113FAB5030E}" type="datetimeFigureOut">
               <a:rPr lang="en-US" smtClean="0"/>
-              <a:t>4/12/2019</a:t>
+              <a:t>4/14/2019</a:t>
             </a:fld>
             <a:endParaRPr lang="en-US"/>
           </a:p>
@@ -1805,7 +1883,7 @@
           <a:p>
             <a:fld id="{1D3EE5B7-680E-44FF-962F-3113FAB5030E}" type="datetimeFigureOut">
               <a:rPr lang="en-US" smtClean="0"/>
-              <a:t>4/12/2019</a:t>
+              <a:t>4/14/2019</a:t>
             </a:fld>
             <a:endParaRPr lang="en-US"/>
           </a:p>
@@ -2113,7 +2191,7 @@
           <a:p>
             <a:fld id="{1D3EE5B7-680E-44FF-962F-3113FAB5030E}" type="datetimeFigureOut">
               <a:rPr lang="en-US" smtClean="0"/>
-              <a:t>4/12/2019</a:t>
+              <a:t>4/14/2019</a:t>
             </a:fld>
             <a:endParaRPr lang="en-US"/>
           </a:p>
@@ -2560,7 +2638,7 @@
           <a:p>
             <a:fld id="{1D3EE5B7-680E-44FF-962F-3113FAB5030E}" type="datetimeFigureOut">
               <a:rPr lang="en-US" smtClean="0"/>
-              <a:t>4/12/2019</a:t>
+              <a:t>4/14/2019</a:t>
             </a:fld>
             <a:endParaRPr lang="en-US"/>
           </a:p>
@@ -2694,7 +2772,7 @@
           <a:p>
             <a:fld id="{1D3EE5B7-680E-44FF-962F-3113FAB5030E}" type="datetimeFigureOut">
               <a:rPr lang="en-US" smtClean="0"/>
-              <a:t>4/12/2019</a:t>
+              <a:t>4/14/2019</a:t>
             </a:fld>
             <a:endParaRPr lang="en-US"/>
           </a:p>
@@ -2802,7 +2880,7 @@
           <a:p>
             <a:fld id="{1D3EE5B7-680E-44FF-962F-3113FAB5030E}" type="datetimeFigureOut">
               <a:rPr lang="en-US" smtClean="0"/>
-              <a:t>4/12/2019</a:t>
+              <a:t>4/14/2019</a:t>
             </a:fld>
             <a:endParaRPr lang="en-US"/>
           </a:p>
@@ -3099,7 +3177,7 @@
           <a:p>
             <a:fld id="{1D3EE5B7-680E-44FF-962F-3113FAB5030E}" type="datetimeFigureOut">
               <a:rPr lang="en-US" smtClean="0"/>
-              <a:t>4/12/2019</a:t>
+              <a:t>4/14/2019</a:t>
             </a:fld>
             <a:endParaRPr lang="en-US"/>
           </a:p>
@@ -3373,7 +3451,7 @@
           <a:p>
             <a:fld id="{1D3EE5B7-680E-44FF-962F-3113FAB5030E}" type="datetimeFigureOut">
               <a:rPr lang="en-US" smtClean="0"/>
-              <a:t>4/12/2019</a:t>
+              <a:t>4/14/2019</a:t>
             </a:fld>
             <a:endParaRPr lang="en-US"/>
           </a:p>
@@ -3604,7 +3682,7 @@
           <a:p>
             <a:fld id="{1D3EE5B7-680E-44FF-962F-3113FAB5030E}" type="datetimeFigureOut">
               <a:rPr lang="en-US" smtClean="0"/>
-              <a:t>4/12/2019</a:t>
+              <a:t>4/14/2019</a:t>
             </a:fld>
             <a:endParaRPr lang="en-US"/>
           </a:p>
@@ -4213,8 +4291,8 @@
         </p:nvSpPr>
         <p:spPr bwMode="auto">
           <a:xfrm>
-            <a:off x="25091563" y="4835368"/>
-            <a:ext cx="7072312" cy="16671216"/>
+            <a:off x="25091563" y="4359999"/>
+            <a:ext cx="7072312" cy="17163659"/>
           </a:xfrm>
           <a:prstGeom prst="rect">
             <a:avLst/>
@@ -4350,18 +4428,12 @@
             </a:endParaRPr>
           </a:p>
           <a:p>
-            <a:endParaRPr lang="en-US" sz="1600" dirty="0">
-              <a:latin typeface="Arial" panose="020B0604020202020204" pitchFamily="34" charset="0"/>
-              <a:cs typeface="Arial" panose="020B0604020202020204" pitchFamily="34" charset="0"/>
-            </a:endParaRPr>
-          </a:p>
-          <a:p>
             <a:r>
               <a:rPr lang="en-US" sz="1600" b="1" dirty="0">
                 <a:latin typeface="Arial" panose="020B0604020202020204" pitchFamily="34" charset="0"/>
                 <a:cs typeface="Arial" panose="020B0604020202020204" pitchFamily="34" charset="0"/>
               </a:rPr>
-              <a:t>Increment </a:t>
+              <a:t>DEVELOPMENT STATISTICS </a:t>
             </a:r>
           </a:p>
           <a:p>
@@ -4371,26 +4443,63 @@
             </a:endParaRPr>
           </a:p>
           <a:p>
+            <a:r>
+              <a:rPr lang="en-US" sz="1600" b="1" dirty="0">
+                <a:latin typeface="Arial" panose="020B0604020202020204" pitchFamily="34" charset="0"/>
+                <a:cs typeface="Arial" panose="020B0604020202020204" pitchFamily="34" charset="0"/>
+              </a:rPr>
+              <a:t>Modifications:</a:t>
+            </a:r>
+          </a:p>
+          <a:p>
+            <a:r>
+              <a:rPr lang="en-US" sz="1600" b="1" dirty="0">
+                <a:latin typeface="Arial" panose="020B0604020202020204" pitchFamily="34" charset="0"/>
+                <a:cs typeface="Arial" panose="020B0604020202020204" pitchFamily="34" charset="0"/>
+              </a:rPr>
+              <a:t>Files:</a:t>
+            </a:r>
+          </a:p>
+          <a:p>
+            <a:r>
+              <a:rPr lang="en-US" sz="1600" b="1" dirty="0">
+                <a:latin typeface="Arial" panose="020B0604020202020204" pitchFamily="34" charset="0"/>
+                <a:cs typeface="Arial" panose="020B0604020202020204" pitchFamily="34" charset="0"/>
+              </a:rPr>
+              <a:t>Lines:</a:t>
+            </a:r>
+          </a:p>
+          <a:p>
             <a:endParaRPr lang="en-US" sz="1600" b="1" dirty="0">
               <a:latin typeface="Arial" panose="020B0604020202020204" pitchFamily="34" charset="0"/>
               <a:cs typeface="Arial" panose="020B0604020202020204" pitchFamily="34" charset="0"/>
             </a:endParaRPr>
           </a:p>
           <a:p>
-            <a:pPr algn="ctr"/>
-            <a:r>
-              <a:rPr lang="en-US" sz="1600" i="1" dirty="0">
-                <a:latin typeface="Arial" panose="020B0604020202020204" pitchFamily="34" charset="0"/>
-                <a:cs typeface="Arial" panose="020B0604020202020204" pitchFamily="34" charset="0"/>
-              </a:rPr>
-              <a:t>Blurb and photo to be inserted</a:t>
-            </a:r>
+            <a:r>
+              <a:rPr lang="en-US" sz="1600" b="1" dirty="0">
+                <a:latin typeface="Arial" panose="020B0604020202020204" pitchFamily="34" charset="0"/>
+                <a:cs typeface="Arial" panose="020B0604020202020204" pitchFamily="34" charset="0"/>
+              </a:rPr>
+              <a:t>EXAMPLE OUTPUT FROM TEST CASES:</a:t>
+            </a:r>
+          </a:p>
+          <a:p>
             <a:endParaRPr lang="en-US" sz="1600" b="1" dirty="0">
               <a:latin typeface="Arial" panose="020B0604020202020204" pitchFamily="34" charset="0"/>
               <a:cs typeface="Arial" panose="020B0604020202020204" pitchFamily="34" charset="0"/>
             </a:endParaRPr>
           </a:p>
           <a:p>
+            <a:r>
+              <a:rPr lang="en-US" sz="1600" b="1" dirty="0">
+                <a:latin typeface="Arial" panose="020B0604020202020204" pitchFamily="34" charset="0"/>
+                <a:cs typeface="Arial" panose="020B0604020202020204" pitchFamily="34" charset="0"/>
+              </a:rPr>
+              <a:t>Increment/ Decrement  </a:t>
+            </a:r>
+          </a:p>
+          <a:p>
             <a:endParaRPr lang="en-US" sz="1600" b="1" dirty="0">
               <a:latin typeface="Arial" panose="020B0604020202020204" pitchFamily="34" charset="0"/>
               <a:cs typeface="Arial" panose="020B0604020202020204" pitchFamily="34" charset="0"/>
@@ -4403,6 +4512,14 @@
             </a:endParaRPr>
           </a:p>
           <a:p>
+            <a:pPr algn="ctr"/>
+            <a:r>
+              <a:rPr lang="en-US" sz="1600" i="1" dirty="0">
+                <a:latin typeface="Arial" panose="020B0604020202020204" pitchFamily="34" charset="0"/>
+                <a:cs typeface="Arial" panose="020B0604020202020204" pitchFamily="34" charset="0"/>
+              </a:rPr>
+              <a:t>Blurb and photo to be inserted</a:t>
+            </a:r>
             <a:endParaRPr lang="en-US" sz="1600" b="1" dirty="0">
               <a:latin typeface="Arial" panose="020B0604020202020204" pitchFamily="34" charset="0"/>
               <a:cs typeface="Arial" panose="020B0604020202020204" pitchFamily="34" charset="0"/>
@@ -4415,13 +4532,38 @@
             </a:endParaRPr>
           </a:p>
           <a:p>
+            <a:endParaRPr lang="en-US" sz="1600" b="1" dirty="0">
+              <a:latin typeface="Arial" panose="020B0604020202020204" pitchFamily="34" charset="0"/>
+              <a:cs typeface="Arial" panose="020B0604020202020204" pitchFamily="34" charset="0"/>
+            </a:endParaRPr>
+          </a:p>
+          <a:p>
             <a:r>
               <a:rPr lang="en-US" sz="1600" b="1" dirty="0">
                 <a:latin typeface="Arial" panose="020B0604020202020204" pitchFamily="34" charset="0"/>
                 <a:cs typeface="Arial" panose="020B0604020202020204" pitchFamily="34" charset="0"/>
               </a:rPr>
-              <a:t>Decrement</a:t>
-            </a:r>
+              <a:t>Until</a:t>
+            </a:r>
+          </a:p>
+          <a:p>
+            <a:endParaRPr lang="en-US" sz="1600" b="1" dirty="0">
+              <a:latin typeface="Arial" panose="020B0604020202020204" pitchFamily="34" charset="0"/>
+              <a:cs typeface="Arial" panose="020B0604020202020204" pitchFamily="34" charset="0"/>
+            </a:endParaRPr>
+          </a:p>
+          <a:p>
+            <a:r>
+              <a:rPr lang="en-US" sz="1600" i="1" dirty="0">
+                <a:latin typeface="Arial" panose="020B0604020202020204" pitchFamily="34" charset="0"/>
+                <a:cs typeface="Arial" panose="020B0604020202020204" pitchFamily="34" charset="0"/>
+              </a:rPr>
+              <a:t>Blurb and photo to be inserted</a:t>
+            </a:r>
+            <a:endParaRPr lang="en-US" sz="1600" b="1" dirty="0">
+              <a:latin typeface="Arial" panose="020B0604020202020204" pitchFamily="34" charset="0"/>
+              <a:cs typeface="Arial" panose="020B0604020202020204" pitchFamily="34" charset="0"/>
+            </a:endParaRPr>
           </a:p>
           <a:p>
             <a:endParaRPr lang="en-US" sz="1600" b="1" dirty="0">
@@ -4444,7 +4586,27 @@
             </a:endParaRPr>
           </a:p>
           <a:p>
-            <a:pPr algn="ctr"/>
+            <a:endParaRPr lang="en-US" sz="1600" dirty="0">
+              <a:latin typeface="Arial" panose="020B0604020202020204" pitchFamily="34" charset="0"/>
+              <a:cs typeface="Arial" panose="020B0604020202020204" pitchFamily="34" charset="0"/>
+            </a:endParaRPr>
+          </a:p>
+          <a:p>
+            <a:r>
+              <a:rPr lang="en-US" sz="1600" b="1" dirty="0">
+                <a:latin typeface="Arial" panose="020B0604020202020204" pitchFamily="34" charset="0"/>
+                <a:cs typeface="Arial" panose="020B0604020202020204" pitchFamily="34" charset="0"/>
+              </a:rPr>
+              <a:t>Unless</a:t>
+            </a:r>
+          </a:p>
+          <a:p>
+            <a:endParaRPr lang="en-US" sz="1600" dirty="0">
+              <a:latin typeface="Arial" panose="020B0604020202020204" pitchFamily="34" charset="0"/>
+              <a:cs typeface="Arial" panose="020B0604020202020204" pitchFamily="34" charset="0"/>
+            </a:endParaRPr>
+          </a:p>
+          <a:p>
             <a:r>
               <a:rPr lang="en-US" sz="1600" i="1" dirty="0">
                 <a:latin typeface="Arial" panose="020B0604020202020204" pitchFamily="34" charset="0"/>
@@ -4458,233 +4620,6 @@
             </a:endParaRPr>
           </a:p>
           <a:p>
-            <a:endParaRPr lang="en-US" sz="1600" b="1" dirty="0">
-              <a:latin typeface="Arial" panose="020B0604020202020204" pitchFamily="34" charset="0"/>
-              <a:cs typeface="Arial" panose="020B0604020202020204" pitchFamily="34" charset="0"/>
-            </a:endParaRPr>
-          </a:p>
-          <a:p>
-            <a:endParaRPr lang="en-US" sz="1600" b="1" dirty="0">
-              <a:latin typeface="Arial" panose="020B0604020202020204" pitchFamily="34" charset="0"/>
-              <a:cs typeface="Arial" panose="020B0604020202020204" pitchFamily="34" charset="0"/>
-            </a:endParaRPr>
-          </a:p>
-          <a:p>
-            <a:endParaRPr lang="en-US" sz="1600" b="1" dirty="0">
-              <a:latin typeface="Arial" panose="020B0604020202020204" pitchFamily="34" charset="0"/>
-              <a:cs typeface="Arial" panose="020B0604020202020204" pitchFamily="34" charset="0"/>
-            </a:endParaRPr>
-          </a:p>
-          <a:p>
-            <a:r>
-              <a:rPr lang="en-US" sz="1600" b="1" dirty="0">
-                <a:latin typeface="Arial" panose="020B0604020202020204" pitchFamily="34" charset="0"/>
-                <a:cs typeface="Arial" panose="020B0604020202020204" pitchFamily="34" charset="0"/>
-              </a:rPr>
-              <a:t>Until</a:t>
-            </a:r>
-          </a:p>
-          <a:p>
-            <a:endParaRPr lang="en-US" sz="1600" b="1" dirty="0">
-              <a:latin typeface="Arial" panose="020B0604020202020204" pitchFamily="34" charset="0"/>
-              <a:cs typeface="Arial" panose="020B0604020202020204" pitchFamily="34" charset="0"/>
-            </a:endParaRPr>
-          </a:p>
-          <a:p>
-            <a:pPr algn="ctr"/>
-            <a:endParaRPr lang="en-US" sz="1600" b="1" dirty="0">
-              <a:latin typeface="Arial" panose="020B0604020202020204" pitchFamily="34" charset="0"/>
-              <a:cs typeface="Arial" panose="020B0604020202020204" pitchFamily="34" charset="0"/>
-            </a:endParaRPr>
-          </a:p>
-          <a:p>
-            <a:pPr algn="ctr"/>
-            <a:endParaRPr lang="en-US" sz="1600" b="1" dirty="0">
-              <a:latin typeface="Arial" panose="020B0604020202020204" pitchFamily="34" charset="0"/>
-              <a:cs typeface="Arial" panose="020B0604020202020204" pitchFamily="34" charset="0"/>
-            </a:endParaRPr>
-          </a:p>
-          <a:p>
-            <a:pPr algn="ctr"/>
-            <a:r>
-              <a:rPr lang="en-US" sz="1600" i="1" dirty="0">
-                <a:latin typeface="Arial" panose="020B0604020202020204" pitchFamily="34" charset="0"/>
-                <a:cs typeface="Arial" panose="020B0604020202020204" pitchFamily="34" charset="0"/>
-              </a:rPr>
-              <a:t>Blurb and photo to be inserted</a:t>
-            </a:r>
-            <a:endParaRPr lang="en-US" sz="1600" b="1" dirty="0">
-              <a:latin typeface="Arial" panose="020B0604020202020204" pitchFamily="34" charset="0"/>
-              <a:cs typeface="Arial" panose="020B0604020202020204" pitchFamily="34" charset="0"/>
-            </a:endParaRPr>
-          </a:p>
-          <a:p>
-            <a:endParaRPr lang="en-US" sz="1600" b="1" dirty="0">
-              <a:latin typeface="Arial" panose="020B0604020202020204" pitchFamily="34" charset="0"/>
-              <a:cs typeface="Arial" panose="020B0604020202020204" pitchFamily="34" charset="0"/>
-            </a:endParaRPr>
-          </a:p>
-          <a:p>
-            <a:endParaRPr lang="en-US" sz="1600" b="1" dirty="0">
-              <a:latin typeface="Arial" panose="020B0604020202020204" pitchFamily="34" charset="0"/>
-              <a:cs typeface="Arial" panose="020B0604020202020204" pitchFamily="34" charset="0"/>
-            </a:endParaRPr>
-          </a:p>
-          <a:p>
-            <a:endParaRPr lang="en-US" sz="1600" b="1" dirty="0">
-              <a:latin typeface="Arial" panose="020B0604020202020204" pitchFamily="34" charset="0"/>
-              <a:cs typeface="Arial" panose="020B0604020202020204" pitchFamily="34" charset="0"/>
-            </a:endParaRPr>
-          </a:p>
-          <a:p>
-            <a:r>
-              <a:rPr lang="en-US" sz="1600" b="1" dirty="0">
-                <a:latin typeface="Arial" panose="020B0604020202020204" pitchFamily="34" charset="0"/>
-                <a:cs typeface="Arial" panose="020B0604020202020204" pitchFamily="34" charset="0"/>
-              </a:rPr>
-              <a:t>Unless</a:t>
-            </a:r>
-          </a:p>
-          <a:p>
-            <a:endParaRPr lang="en-US" sz="1600" b="1" dirty="0">
-              <a:latin typeface="Arial" panose="020B0604020202020204" pitchFamily="34" charset="0"/>
-              <a:cs typeface="Arial" panose="020B0604020202020204" pitchFamily="34" charset="0"/>
-            </a:endParaRPr>
-          </a:p>
-          <a:p>
-            <a:endParaRPr lang="en-US" sz="1600" b="1" dirty="0">
-              <a:latin typeface="Arial" panose="020B0604020202020204" pitchFamily="34" charset="0"/>
-              <a:cs typeface="Arial" panose="020B0604020202020204" pitchFamily="34" charset="0"/>
-            </a:endParaRPr>
-          </a:p>
-          <a:p>
-            <a:pPr algn="ctr"/>
-            <a:endParaRPr lang="en-US" sz="1600" b="1" dirty="0">
-              <a:latin typeface="Arial" panose="020B0604020202020204" pitchFamily="34" charset="0"/>
-              <a:cs typeface="Arial" panose="020B0604020202020204" pitchFamily="34" charset="0"/>
-            </a:endParaRPr>
-          </a:p>
-          <a:p>
-            <a:pPr algn="ctr"/>
-            <a:r>
-              <a:rPr lang="en-US" sz="1600" i="1" dirty="0">
-                <a:latin typeface="Arial" panose="020B0604020202020204" pitchFamily="34" charset="0"/>
-                <a:cs typeface="Arial" panose="020B0604020202020204" pitchFamily="34" charset="0"/>
-              </a:rPr>
-              <a:t>Blurb and photo to be inserted</a:t>
-            </a:r>
-            <a:endParaRPr lang="en-US" sz="1600" b="1" dirty="0">
-              <a:latin typeface="Arial" panose="020B0604020202020204" pitchFamily="34" charset="0"/>
-              <a:cs typeface="Arial" panose="020B0604020202020204" pitchFamily="34" charset="0"/>
-            </a:endParaRPr>
-          </a:p>
-          <a:p>
-            <a:endParaRPr lang="en-US" sz="1600" b="1" dirty="0">
-              <a:latin typeface="Arial" panose="020B0604020202020204" pitchFamily="34" charset="0"/>
-              <a:cs typeface="Arial" panose="020B0604020202020204" pitchFamily="34" charset="0"/>
-            </a:endParaRPr>
-          </a:p>
-          <a:p>
-            <a:endParaRPr lang="en-US" sz="1600" b="1" dirty="0">
-              <a:latin typeface="Arial" panose="020B0604020202020204" pitchFamily="34" charset="0"/>
-              <a:cs typeface="Arial" panose="020B0604020202020204" pitchFamily="34" charset="0"/>
-            </a:endParaRPr>
-          </a:p>
-          <a:p>
-            <a:endParaRPr lang="en-US" sz="1600" b="1" dirty="0">
-              <a:latin typeface="Arial" panose="020B0604020202020204" pitchFamily="34" charset="0"/>
-              <a:cs typeface="Arial" panose="020B0604020202020204" pitchFamily="34" charset="0"/>
-            </a:endParaRPr>
-          </a:p>
-          <a:p>
-            <a:endParaRPr lang="en-US" sz="1600" b="1" dirty="0">
-              <a:latin typeface="Arial" panose="020B0604020202020204" pitchFamily="34" charset="0"/>
-              <a:cs typeface="Arial" panose="020B0604020202020204" pitchFamily="34" charset="0"/>
-            </a:endParaRPr>
-          </a:p>
-          <a:p>
-            <a:r>
-              <a:rPr lang="en-US" sz="1600" b="1" dirty="0">
-                <a:latin typeface="Arial" panose="020B0604020202020204" pitchFamily="34" charset="0"/>
-                <a:cs typeface="Arial" panose="020B0604020202020204" pitchFamily="34" charset="0"/>
-              </a:rPr>
-              <a:t>Do-While </a:t>
-            </a:r>
-          </a:p>
-          <a:p>
-            <a:endParaRPr lang="en-US" sz="1600" b="1" dirty="0">
-              <a:latin typeface="Arial" panose="020B0604020202020204" pitchFamily="34" charset="0"/>
-              <a:cs typeface="Arial" panose="020B0604020202020204" pitchFamily="34" charset="0"/>
-            </a:endParaRPr>
-          </a:p>
-          <a:p>
-            <a:pPr algn="ctr"/>
-            <a:endParaRPr lang="en-US" sz="1600" b="1" dirty="0">
-              <a:latin typeface="Arial" panose="020B0604020202020204" pitchFamily="34" charset="0"/>
-              <a:cs typeface="Arial" panose="020B0604020202020204" pitchFamily="34" charset="0"/>
-            </a:endParaRPr>
-          </a:p>
-          <a:p>
-            <a:pPr algn="ctr"/>
-            <a:endParaRPr lang="en-US" sz="1600" b="1" dirty="0">
-              <a:latin typeface="Arial" panose="020B0604020202020204" pitchFamily="34" charset="0"/>
-              <a:cs typeface="Arial" panose="020B0604020202020204" pitchFamily="34" charset="0"/>
-            </a:endParaRPr>
-          </a:p>
-          <a:p>
-            <a:pPr algn="ctr"/>
-            <a:r>
-              <a:rPr lang="en-US" sz="1600" i="1" dirty="0">
-                <a:latin typeface="Arial" panose="020B0604020202020204" pitchFamily="34" charset="0"/>
-                <a:cs typeface="Arial" panose="020B0604020202020204" pitchFamily="34" charset="0"/>
-              </a:rPr>
-              <a:t>Blurb and photo to be inserted</a:t>
-            </a:r>
-            <a:endParaRPr lang="en-US" sz="1600" b="1" dirty="0">
-              <a:latin typeface="Arial" panose="020B0604020202020204" pitchFamily="34" charset="0"/>
-              <a:cs typeface="Arial" panose="020B0604020202020204" pitchFamily="34" charset="0"/>
-            </a:endParaRPr>
-          </a:p>
-          <a:p>
-            <a:endParaRPr lang="en-US" sz="1600" b="1" dirty="0">
-              <a:latin typeface="Arial" panose="020B0604020202020204" pitchFamily="34" charset="0"/>
-              <a:cs typeface="Arial" panose="020B0604020202020204" pitchFamily="34" charset="0"/>
-            </a:endParaRPr>
-          </a:p>
-          <a:p>
-            <a:endParaRPr lang="en-US" sz="1600" b="1" dirty="0">
-              <a:latin typeface="Arial" panose="020B0604020202020204" pitchFamily="34" charset="0"/>
-              <a:cs typeface="Arial" panose="020B0604020202020204" pitchFamily="34" charset="0"/>
-            </a:endParaRPr>
-          </a:p>
-          <a:p>
-            <a:endParaRPr lang="en-US" sz="1600" b="1" dirty="0">
-              <a:latin typeface="Arial" panose="020B0604020202020204" pitchFamily="34" charset="0"/>
-              <a:cs typeface="Arial" panose="020B0604020202020204" pitchFamily="34" charset="0"/>
-            </a:endParaRPr>
-          </a:p>
-          <a:p>
-            <a:endParaRPr lang="en-US" sz="1600" b="1" dirty="0">
-              <a:latin typeface="Arial" panose="020B0604020202020204" pitchFamily="34" charset="0"/>
-              <a:cs typeface="Arial" panose="020B0604020202020204" pitchFamily="34" charset="0"/>
-            </a:endParaRPr>
-          </a:p>
-          <a:p>
-            <a:endParaRPr lang="en-US" sz="1600" b="1" dirty="0">
-              <a:latin typeface="Arial" panose="020B0604020202020204" pitchFamily="34" charset="0"/>
-              <a:cs typeface="Arial" panose="020B0604020202020204" pitchFamily="34" charset="0"/>
-            </a:endParaRPr>
-          </a:p>
-          <a:p>
-            <a:r>
-              <a:rPr lang="en-US" sz="1600" b="1" dirty="0">
-                <a:latin typeface="Arial" panose="020B0604020202020204" pitchFamily="34" charset="0"/>
-                <a:cs typeface="Arial" panose="020B0604020202020204" pitchFamily="34" charset="0"/>
-              </a:rPr>
-              <a:t>Switch-Case Statements</a:t>
-            </a:r>
-          </a:p>
-          <a:p>
             <a:endParaRPr lang="en-US" sz="1600" dirty="0">
               <a:latin typeface="Arial" panose="020B0604020202020204" pitchFamily="34" charset="0"/>
               <a:cs typeface="Arial" panose="020B0604020202020204" pitchFamily="34" charset="0"/>
@@ -4703,14 +4638,87 @@
             </a:endParaRPr>
           </a:p>
           <a:p>
-            <a:pPr algn="ctr"/>
-            <a:r>
-              <a:rPr lang="en-US" sz="1600" i="1" dirty="0">
-                <a:latin typeface="Arial" panose="020B0604020202020204" pitchFamily="34" charset="0"/>
-                <a:cs typeface="Arial" panose="020B0604020202020204" pitchFamily="34" charset="0"/>
-              </a:rPr>
-              <a:t>Blurb and photo to be inserted </a:t>
-            </a:r>
+            <a:endParaRPr lang="en-US" sz="1600" dirty="0">
+              <a:latin typeface="Arial" panose="020B0604020202020204" pitchFamily="34" charset="0"/>
+              <a:cs typeface="Arial" panose="020B0604020202020204" pitchFamily="34" charset="0"/>
+            </a:endParaRPr>
+          </a:p>
+          <a:p>
+            <a:endParaRPr lang="en-US" sz="1600" dirty="0">
+              <a:latin typeface="Arial" panose="020B0604020202020204" pitchFamily="34" charset="0"/>
+              <a:cs typeface="Arial" panose="020B0604020202020204" pitchFamily="34" charset="0"/>
+            </a:endParaRPr>
+          </a:p>
+          <a:p>
+            <a:endParaRPr lang="en-US" sz="1600" dirty="0">
+              <a:latin typeface="Arial" panose="020B0604020202020204" pitchFamily="34" charset="0"/>
+              <a:cs typeface="Arial" panose="020B0604020202020204" pitchFamily="34" charset="0"/>
+            </a:endParaRPr>
+          </a:p>
+          <a:p>
+            <a:endParaRPr lang="en-US" sz="1600" dirty="0">
+              <a:latin typeface="Arial" panose="020B0604020202020204" pitchFamily="34" charset="0"/>
+              <a:cs typeface="Arial" panose="020B0604020202020204" pitchFamily="34" charset="0"/>
+            </a:endParaRPr>
+          </a:p>
+          <a:p>
+            <a:endParaRPr lang="en-US" sz="1600" dirty="0">
+              <a:latin typeface="Arial" panose="020B0604020202020204" pitchFamily="34" charset="0"/>
+              <a:cs typeface="Arial" panose="020B0604020202020204" pitchFamily="34" charset="0"/>
+            </a:endParaRPr>
+          </a:p>
+          <a:p>
+            <a:r>
+              <a:rPr lang="en-US" sz="1600" dirty="0">
+                <a:latin typeface="Arial" panose="020B0604020202020204" pitchFamily="34" charset="0"/>
+                <a:cs typeface="Arial" panose="020B0604020202020204" pitchFamily="34" charset="0"/>
+              </a:rPr>
+              <a:t>The most challenging part of this project was the size and complexity of the code. It was very challenging at first to find what we were looking for and understand how everything was connected. In hindsight, we didn’t have to write hundreds of lines of codes but we spent a long time understand where code changes need to happen and how bytecode worked. This was further magnified by the out of date documentation and heavy use of macros. It was very much a treasure hunt. Similarly, some code was auto-generated once the </a:t>
+            </a:r>
+            <a:r>
+              <a:rPr lang="en-US" sz="1600" dirty="0" err="1">
+                <a:latin typeface="Arial" panose="020B0604020202020204" pitchFamily="34" charset="0"/>
+                <a:cs typeface="Arial" panose="020B0604020202020204" pitchFamily="34" charset="0"/>
+              </a:rPr>
+              <a:t>Makefile</a:t>
+            </a:r>
+            <a:r>
+              <a:rPr lang="en-US" sz="1600" dirty="0">
+                <a:latin typeface="Arial" panose="020B0604020202020204" pitchFamily="34" charset="0"/>
+                <a:cs typeface="Arial" panose="020B0604020202020204" pitchFamily="34" charset="0"/>
+              </a:rPr>
+              <a:t> was called but some were not. For example, any grammar changes wont be compiled unless a regen-grammar command is called on the make file. This is something we wish we new early.  If we were to do this project again, we would definitely try to implement some compiler optimizations like constant folding. (ADD SOMETHING ELSE). Looking forward, we would love to try and implement some of existing PEP’s , most notably(PEPS).</a:t>
+            </a:r>
+          </a:p>
+          <a:p>
+            <a:endParaRPr lang="en-US" sz="1600" dirty="0">
+              <a:latin typeface="Arial" panose="020B0604020202020204" pitchFamily="34" charset="0"/>
+              <a:cs typeface="Arial" panose="020B0604020202020204" pitchFamily="34" charset="0"/>
+            </a:endParaRPr>
+          </a:p>
+          <a:p>
+            <a:endParaRPr lang="en-US" sz="1600" dirty="0">
+              <a:latin typeface="Arial" panose="020B0604020202020204" pitchFamily="34" charset="0"/>
+              <a:cs typeface="Arial" panose="020B0604020202020204" pitchFamily="34" charset="0"/>
+            </a:endParaRPr>
+          </a:p>
+          <a:p>
+            <a:endParaRPr lang="en-US" sz="1600" dirty="0">
+              <a:latin typeface="Arial" panose="020B0604020202020204" pitchFamily="34" charset="0"/>
+              <a:cs typeface="Arial" panose="020B0604020202020204" pitchFamily="34" charset="0"/>
+            </a:endParaRPr>
+          </a:p>
+          <a:p>
+            <a:endParaRPr lang="en-US" sz="1600" dirty="0">
+              <a:latin typeface="Arial" panose="020B0604020202020204" pitchFamily="34" charset="0"/>
+              <a:cs typeface="Arial" panose="020B0604020202020204" pitchFamily="34" charset="0"/>
+            </a:endParaRPr>
+          </a:p>
+          <a:p>
+            <a:endParaRPr lang="en-US" sz="1600">
+              <a:latin typeface="Arial" panose="020B0604020202020204" pitchFamily="34" charset="0"/>
+              <a:cs typeface="Arial" panose="020B0604020202020204" pitchFamily="34" charset="0"/>
+            </a:endParaRPr>
           </a:p>
           <a:p>
             <a:endParaRPr lang="en-US" sz="1600" dirty="0">
@@ -4913,7 +4921,7 @@
         </p:nvSpPr>
         <p:spPr bwMode="auto">
           <a:xfrm>
-            <a:off x="16983076" y="4576427"/>
+            <a:off x="16978707" y="4121402"/>
             <a:ext cx="7072312" cy="1107981"/>
           </a:xfrm>
           <a:prstGeom prst="rect">
@@ -5087,8 +5095,8 @@
         </p:nvSpPr>
         <p:spPr bwMode="auto">
           <a:xfrm>
-            <a:off x="8863013" y="5055388"/>
-            <a:ext cx="7377111" cy="11345656"/>
+            <a:off x="8809341" y="4503627"/>
+            <a:ext cx="7377111" cy="11751921"/>
           </a:xfrm>
           <a:prstGeom prst="rect">
             <a:avLst/>
@@ -5223,14 +5231,11 @@
                 <a:spcPct val="110000"/>
               </a:lnSpc>
             </a:pPr>
-            <a:r>
-              <a:rPr lang="en-US" sz="1800" b="1" dirty="0">
-                <a:latin typeface="Arial" panose="020B0604020202020204" pitchFamily="34" charset="0"/>
-                <a:ea typeface="Open Sans" panose="020B0606030504020204" pitchFamily="34" charset="0"/>
-                <a:cs typeface="Arial" panose="020B0604020202020204" pitchFamily="34" charset="0"/>
-              </a:rPr>
-              <a:t> </a:t>
-            </a:r>
+            <a:endParaRPr lang="en-US" sz="1800" b="1" dirty="0">
+              <a:latin typeface="Arial" panose="020B0604020202020204" pitchFamily="34" charset="0"/>
+              <a:ea typeface="Open Sans" panose="020B0606030504020204" pitchFamily="34" charset="0"/>
+              <a:cs typeface="Arial" panose="020B0604020202020204" pitchFamily="34" charset="0"/>
+            </a:endParaRPr>
           </a:p>
           <a:p>
             <a:pPr algn="just">
@@ -5238,6 +5243,14 @@
                 <a:spcPct val="110000"/>
               </a:lnSpc>
             </a:pPr>
+            <a:r>
+              <a:rPr lang="en-US" sz="1800" b="1" dirty="0">
+                <a:latin typeface="Arial" panose="020B0604020202020204" pitchFamily="34" charset="0"/>
+                <a:ea typeface="Open Sans" panose="020B0606030504020204" pitchFamily="34" charset="0"/>
+                <a:cs typeface="Arial" panose="020B0604020202020204" pitchFamily="34" charset="0"/>
+              </a:rPr>
+              <a:t> </a:t>
+            </a:r>
             <a:r>
               <a:rPr lang="en-US" sz="2400" b="1" dirty="0">
                 <a:latin typeface="Arial" panose="020B0604020202020204" pitchFamily="34" charset="0"/>
@@ -5411,7 +5424,7 @@
                 <a:ea typeface="Open Sans" panose="020B0606030504020204" pitchFamily="34" charset="0"/>
                 <a:cs typeface="Arial" panose="020B0604020202020204" pitchFamily="34" charset="0"/>
               </a:rPr>
-              <a:t>Do While : 7 nodes</a:t>
+              <a:t>Do While: 7 nodes</a:t>
             </a:r>
           </a:p>
           <a:p>
@@ -5428,7 +5441,7 @@
                 <a:ea typeface="Open Sans" panose="020B0606030504020204" pitchFamily="34" charset="0"/>
                 <a:cs typeface="Arial" panose="020B0604020202020204" pitchFamily="34" charset="0"/>
               </a:rPr>
-              <a:t>While, Else : 7 nodes</a:t>
+              <a:t>While, Else: 7 nodes</a:t>
             </a:r>
           </a:p>
           <a:p>
@@ -5586,8 +5599,8 @@
         </p:nvSpPr>
         <p:spPr bwMode="auto">
           <a:xfrm>
-            <a:off x="742950" y="4775066"/>
-            <a:ext cx="7060406" cy="15696591"/>
+            <a:off x="690589" y="4145241"/>
+            <a:ext cx="7060406" cy="16189033"/>
           </a:xfrm>
           <a:prstGeom prst="rect">
             <a:avLst/>
@@ -5719,6 +5732,12 @@
             </a:endParaRPr>
           </a:p>
           <a:p>
+            <a:endParaRPr lang="en-US" sz="2400" dirty="0">
+              <a:latin typeface="Arial" panose="020B0604020202020204" pitchFamily="34" charset="0"/>
+              <a:cs typeface="Arial" panose="020B0604020202020204" pitchFamily="34" charset="0"/>
+            </a:endParaRPr>
+          </a:p>
+          <a:p>
             <a:r>
               <a:rPr lang="en-US" sz="2400" dirty="0">
                 <a:latin typeface="Arial" panose="020B0604020202020204" pitchFamily="34" charset="0"/>
@@ -5813,7 +5832,7 @@
                 <a:ea typeface="+mn-ea"/>
                 <a:cs typeface="Arial" panose="020B0604020202020204" pitchFamily="34" charset="0"/>
               </a:rPr>
-              <a:t>In order to alter Python, we took advantage of the  CPython compiler which has multiple components for compilation which include the following steps</a:t>
+              <a:t>In order to alter Python, we took advantage of the  CPython compiler (V 3.7) which has multiple components for compilation which include the following steps</a:t>
             </a:r>
             <a:r>
               <a:rPr lang="en-US" sz="2400" baseline="30000" dirty="0">
@@ -6352,7 +6371,7 @@
         <p:spPr>
           <a:xfrm>
             <a:off x="4267200" y="2323485"/>
-            <a:ext cx="24384000" cy="1825115"/>
+            <a:ext cx="24384000" cy="1455783"/>
           </a:xfrm>
           <a:prstGeom prst="rect">
             <a:avLst/>
@@ -6547,22 +6566,6 @@
               <a:defRPr/>
             </a:pPr>
             <a:r>
-              <a:rPr lang="en-US" sz="2000" dirty="0">
-                <a:solidFill>
-                  <a:schemeClr val="tx1"/>
-                </a:solidFill>
-                <a:latin typeface="Arial" panose="020B0604020202020204" pitchFamily="34" charset="0"/>
-                <a:ea typeface="Open Sans" panose="020B0606030504020204" pitchFamily="34" charset="0"/>
-                <a:cs typeface="Arial" panose="020B0604020202020204" pitchFamily="34" charset="0"/>
-              </a:rPr>
-              <a:t>1280 Main St. W, Hamilton, Ontario, Canada L8S 4L8</a:t>
-            </a:r>
-          </a:p>
-          <a:p>
-            <a:pPr algn="ctr">
-              <a:defRPr/>
-            </a:pPr>
-            <a:r>
               <a:rPr lang="en-US" sz="2800" dirty="0">
                 <a:solidFill>
                   <a:schemeClr val="tx1"/>
@@ -6612,7 +6615,7 @@
         </p:nvSpPr>
         <p:spPr>
           <a:xfrm>
-            <a:off x="742950" y="4406201"/>
+            <a:off x="742950" y="3847837"/>
             <a:ext cx="7072312" cy="649188"/>
           </a:xfrm>
           <a:prstGeom prst="round2DiagRect">
@@ -6746,7 +6749,7 @@
         </p:nvSpPr>
         <p:spPr>
           <a:xfrm>
-            <a:off x="8863013" y="4406201"/>
+            <a:off x="8799108" y="3861416"/>
             <a:ext cx="15192375" cy="649188"/>
           </a:xfrm>
           <a:prstGeom prst="round2DiagRect">
@@ -6840,7 +6843,7 @@
         </p:nvSpPr>
         <p:spPr>
           <a:xfrm>
-            <a:off x="25103138" y="4406200"/>
+            <a:off x="25091563" y="3861416"/>
             <a:ext cx="7072312" cy="649188"/>
           </a:xfrm>
           <a:prstGeom prst="round2DiagRect">
@@ -6888,7 +6891,7 @@
                 <a:latin typeface="Arial" panose="020B0604020202020204" pitchFamily="34" charset="0"/>
                 <a:cs typeface="Arial" panose="020B0604020202020204" pitchFamily="34" charset="0"/>
               </a:rPr>
-              <a:t>Usage Results</a:t>
+              <a:t> Results</a:t>
             </a:r>
           </a:p>
         </p:txBody>
@@ -6988,8 +6991,8 @@
         </p:blipFill>
         <p:spPr>
           <a:xfrm>
-            <a:off x="26974800" y="150544"/>
-            <a:ext cx="4188618" cy="4188618"/>
+            <a:off x="27572654" y="150544"/>
+            <a:ext cx="3590763" cy="3590763"/>
           </a:xfrm>
           <a:prstGeom prst="rect">
             <a:avLst/>
@@ -7024,8 +7027,8 @@
         </p:blipFill>
         <p:spPr>
           <a:xfrm>
-            <a:off x="1139190" y="787677"/>
-            <a:ext cx="5586816" cy="3071613"/>
+            <a:off x="1224915" y="699749"/>
+            <a:ext cx="4975860" cy="2735711"/>
           </a:xfrm>
           <a:prstGeom prst="rect">
             <a:avLst/>
@@ -7093,7 +7096,7 @@
         </p:blipFill>
         <p:spPr>
           <a:xfrm>
-            <a:off x="8910688" y="7220955"/>
+            <a:off x="8820916" y="6547277"/>
             <a:ext cx="7394836" cy="1362774"/>
           </a:xfrm>
           <a:prstGeom prst="rect">
@@ -7123,7 +7126,7 @@
         </p:blipFill>
         <p:spPr>
           <a:xfrm>
-            <a:off x="8820916" y="13925648"/>
+            <a:off x="8884820" y="12914354"/>
             <a:ext cx="7574380" cy="5674697"/>
           </a:xfrm>
           <a:prstGeom prst="rect">
@@ -7194,7 +7197,7 @@
                 <a:latin typeface="Arial" panose="020B0604020202020204" pitchFamily="34" charset="0"/>
                 <a:cs typeface="Arial" panose="020B0604020202020204" pitchFamily="34" charset="0"/>
               </a:rPr>
-              <a:t>The code on the right demonstrates, the code that had to be created in order to compile the AST to bytecode. The bytecode is handled via several macros. There are also various helper functions like </a:t>
+              <a:t>The code on the right demonstrates the code that had to be created in order to compile the AST to bytecode. The bytecode is handled via several macros. There are also various helper functions like </a:t>
             </a:r>
             <a:r>
               <a:rPr lang="en-CA" sz="2400" dirty="0" err="1">
@@ -7338,6 +7341,73 @@
           </a:prstGeom>
         </p:spPr>
       </p:pic>
+      <p:sp>
+        <p:nvSpPr>
+          <p:cNvPr id="27" name="TextBox 26">
+            <a:extLst>
+              <a:ext uri="{FF2B5EF4-FFF2-40B4-BE49-F238E27FC236}">
+                <a16:creationId xmlns:a16="http://schemas.microsoft.com/office/drawing/2014/main" id="{953832D9-4B15-4449-A27E-113CDA08D29B}"/>
+              </a:ext>
+            </a:extLst>
+          </p:cNvPr>
+          <p:cNvSpPr txBox="1"/>
+          <p:nvPr/>
+        </p:nvSpPr>
+        <p:spPr>
+          <a:xfrm>
+            <a:off x="25046687" y="11731621"/>
+            <a:ext cx="7072312" cy="649188"/>
+          </a:xfrm>
+          <a:prstGeom prst="round2DiagRect">
+            <a:avLst>
+              <a:gd name="adj1" fmla="val 50000"/>
+              <a:gd name="adj2" fmla="val 0"/>
+            </a:avLst>
+          </a:prstGeom>
+          <a:solidFill>
+            <a:srgbClr val="FFDC50"/>
+          </a:solidFill>
+          <a:ln>
+            <a:noFill/>
+          </a:ln>
+          <a:effectLst/>
+        </p:spPr>
+        <p:style>
+          <a:lnRef idx="2">
+            <a:schemeClr val="dk1"/>
+          </a:lnRef>
+          <a:fillRef idx="1">
+            <a:schemeClr val="lt1"/>
+          </a:fillRef>
+          <a:effectRef idx="0">
+            <a:schemeClr val="dk1"/>
+          </a:effectRef>
+          <a:fontRef idx="minor">
+            <a:schemeClr val="dk1"/>
+          </a:fontRef>
+        </p:style>
+        <p:txBody>
+          <a:bodyPr wrap="square" rtlCol="0" anchor="ctr">
+            <a:noAutofit/>
+          </a:bodyPr>
+          <a:lstStyle/>
+          <a:p>
+            <a:pPr algn="ctr" defTabSz="3135215">
+              <a:defRPr/>
+            </a:pPr>
+            <a:r>
+              <a:rPr lang="en-US" sz="2800" b="1" dirty="0">
+                <a:solidFill>
+                  <a:srgbClr val="346E9D"/>
+                </a:solidFill>
+                <a:latin typeface="Arial" panose="020B0604020202020204" pitchFamily="34" charset="0"/>
+                <a:cs typeface="Arial" panose="020B0604020202020204" pitchFamily="34" charset="0"/>
+              </a:rPr>
+              <a:t>Conclusion</a:t>
+            </a:r>
+          </a:p>
+        </p:txBody>
+      </p:sp>
     </p:spTree>
     <p:extLst>
       <p:ext uri="{BB962C8B-B14F-4D97-AF65-F5344CB8AC3E}">

</xml_diff>

<commit_message>
More minor modifications. Almost complete
</commit_message>
<xml_diff>
--- a/Doc/Poster/poster.pptx
+++ b/Doc/Poster/poster.pptx
@@ -161,20 +161,6 @@
 </p:cmAuthorLst>
 </file>
 
-<file path=ppt/comments/comment1.xml><?xml version="1.0" encoding="utf-8"?>
-<p:cmLst xmlns:a="http://schemas.openxmlformats.org/drawingml/2006/main" xmlns:r="http://schemas.openxmlformats.org/officeDocument/2006/relationships" xmlns:p="http://schemas.openxmlformats.org/presentationml/2006/main">
-  <p:cm authorId="1" dt="2019-04-14T02:43:58.574" idx="1">
-    <p:pos x="10" y="10"/>
-    <p:text/>
-    <p:extLst>
-      <p:ext uri="{C676402C-5697-4E1C-873F-D02D1690AC5C}">
-        <p15:threadingInfo xmlns:p15="http://schemas.microsoft.com/office/powerpoint/2012/main" timeZoneBias="240"/>
-      </p:ext>
-    </p:extLst>
-  </p:cm>
-</p:cmLst>
-</file>
-
 <file path=ppt/handoutMasters/handoutMaster1.xml><?xml version="1.0" encoding="utf-8"?>
 <p:handoutMaster xmlns:a="http://schemas.openxmlformats.org/drawingml/2006/main" xmlns:r="http://schemas.openxmlformats.org/officeDocument/2006/relationships" xmlns:p="http://schemas.openxmlformats.org/presentationml/2006/main">
   <p:cSld>
@@ -263,7 +249,7 @@
           <a:p>
             <a:fld id="{302F586B-0015-43FB-918D-31E1A09780E3}" type="datetimeFigureOut">
               <a:rPr lang="en-US" smtClean="0"/>
-              <a:t>4/14/2019</a:t>
+              <a:t>4/15/2019</a:t>
             </a:fld>
             <a:endParaRPr lang="en-US"/>
           </a:p>
@@ -440,7 +426,7 @@
           <a:p>
             <a:fld id="{7CEAF96C-0DD1-4DCA-AB4B-687076CBD6E7}" type="datetimeFigureOut">
               <a:rPr lang="en-US" smtClean="0"/>
-              <a:t>4/14/2019</a:t>
+              <a:t>4/15/2019</a:t>
             </a:fld>
             <a:endParaRPr lang="en-US"/>
           </a:p>
@@ -1231,7 +1217,7 @@
           <a:p>
             <a:fld id="{1D3EE5B7-680E-44FF-962F-3113FAB5030E}" type="datetimeFigureOut">
               <a:rPr lang="en-US" smtClean="0"/>
-              <a:t>4/14/2019</a:t>
+              <a:t>4/15/2019</a:t>
             </a:fld>
             <a:endParaRPr lang="en-US"/>
           </a:p>
@@ -1430,7 +1416,7 @@
           <a:p>
             <a:fld id="{1D3EE5B7-680E-44FF-962F-3113FAB5030E}" type="datetimeFigureOut">
               <a:rPr lang="en-US" smtClean="0"/>
-              <a:t>4/14/2019</a:t>
+              <a:t>4/15/2019</a:t>
             </a:fld>
             <a:endParaRPr lang="en-US"/>
           </a:p>
@@ -1619,7 +1605,7 @@
           <a:p>
             <a:fld id="{1D3EE5B7-680E-44FF-962F-3113FAB5030E}" type="datetimeFigureOut">
               <a:rPr lang="en-US" smtClean="0"/>
-              <a:t>4/14/2019</a:t>
+              <a:t>4/15/2019</a:t>
             </a:fld>
             <a:endParaRPr lang="en-US"/>
           </a:p>
@@ -1883,7 +1869,7 @@
           <a:p>
             <a:fld id="{1D3EE5B7-680E-44FF-962F-3113FAB5030E}" type="datetimeFigureOut">
               <a:rPr lang="en-US" smtClean="0"/>
-              <a:t>4/14/2019</a:t>
+              <a:t>4/15/2019</a:t>
             </a:fld>
             <a:endParaRPr lang="en-US"/>
           </a:p>
@@ -2191,7 +2177,7 @@
           <a:p>
             <a:fld id="{1D3EE5B7-680E-44FF-962F-3113FAB5030E}" type="datetimeFigureOut">
               <a:rPr lang="en-US" smtClean="0"/>
-              <a:t>4/14/2019</a:t>
+              <a:t>4/15/2019</a:t>
             </a:fld>
             <a:endParaRPr lang="en-US"/>
           </a:p>
@@ -2638,7 +2624,7 @@
           <a:p>
             <a:fld id="{1D3EE5B7-680E-44FF-962F-3113FAB5030E}" type="datetimeFigureOut">
               <a:rPr lang="en-US" smtClean="0"/>
-              <a:t>4/14/2019</a:t>
+              <a:t>4/15/2019</a:t>
             </a:fld>
             <a:endParaRPr lang="en-US"/>
           </a:p>
@@ -2772,7 +2758,7 @@
           <a:p>
             <a:fld id="{1D3EE5B7-680E-44FF-962F-3113FAB5030E}" type="datetimeFigureOut">
               <a:rPr lang="en-US" smtClean="0"/>
-              <a:t>4/14/2019</a:t>
+              <a:t>4/15/2019</a:t>
             </a:fld>
             <a:endParaRPr lang="en-US"/>
           </a:p>
@@ -2880,7 +2866,7 @@
           <a:p>
             <a:fld id="{1D3EE5B7-680E-44FF-962F-3113FAB5030E}" type="datetimeFigureOut">
               <a:rPr lang="en-US" smtClean="0"/>
-              <a:t>4/14/2019</a:t>
+              <a:t>4/15/2019</a:t>
             </a:fld>
             <a:endParaRPr lang="en-US"/>
           </a:p>
@@ -3177,7 +3163,7 @@
           <a:p>
             <a:fld id="{1D3EE5B7-680E-44FF-962F-3113FAB5030E}" type="datetimeFigureOut">
               <a:rPr lang="en-US" smtClean="0"/>
-              <a:t>4/14/2019</a:t>
+              <a:t>4/15/2019</a:t>
             </a:fld>
             <a:endParaRPr lang="en-US"/>
           </a:p>
@@ -3451,7 +3437,7 @@
           <a:p>
             <a:fld id="{1D3EE5B7-680E-44FF-962F-3113FAB5030E}" type="datetimeFigureOut">
               <a:rPr lang="en-US" smtClean="0"/>
-              <a:t>4/14/2019</a:t>
+              <a:t>4/15/2019</a:t>
             </a:fld>
             <a:endParaRPr lang="en-US"/>
           </a:p>
@@ -3682,7 +3668,7 @@
           <a:p>
             <a:fld id="{1D3EE5B7-680E-44FF-962F-3113FAB5030E}" type="datetimeFigureOut">
               <a:rPr lang="en-US" smtClean="0"/>
-              <a:t>4/14/2019</a:t>
+              <a:t>4/15/2019</a:t>
             </a:fld>
             <a:endParaRPr lang="en-US"/>
           </a:p>
@@ -4292,7 +4278,7 @@
         <p:spPr bwMode="auto">
           <a:xfrm>
             <a:off x="25091563" y="4359999"/>
-            <a:ext cx="7072312" cy="17163659"/>
+            <a:ext cx="7072312" cy="17040548"/>
           </a:xfrm>
           <a:prstGeom prst="rect">
             <a:avLst/>
@@ -4669,25 +4655,15 @@
           </a:p>
           <a:p>
             <a:r>
-              <a:rPr lang="en-US" sz="1600" dirty="0">
-                <a:latin typeface="Arial" panose="020B0604020202020204" pitchFamily="34" charset="0"/>
-                <a:cs typeface="Arial" panose="020B0604020202020204" pitchFamily="34" charset="0"/>
-              </a:rPr>
-              <a:t>The most challenging part of this project was the size and complexity of the code. It was very challenging at first to find what we were looking for and understand how everything was connected. In hindsight, we didn’t have to write hundreds of lines of codes but we spent a long time understand where code changes need to happen and how bytecode worked. This was further magnified by the out of date documentation and heavy use of macros. It was very much a treasure hunt. Similarly, some code was auto-generated once the </a:t>
-            </a:r>
-            <a:r>
-              <a:rPr lang="en-US" sz="1600" dirty="0" err="1">
-                <a:latin typeface="Arial" panose="020B0604020202020204" pitchFamily="34" charset="0"/>
-                <a:cs typeface="Arial" panose="020B0604020202020204" pitchFamily="34" charset="0"/>
-              </a:rPr>
-              <a:t>Makefile</a:t>
-            </a:r>
-            <a:r>
-              <a:rPr lang="en-US" sz="1600" dirty="0">
-                <a:latin typeface="Arial" panose="020B0604020202020204" pitchFamily="34" charset="0"/>
-                <a:cs typeface="Arial" panose="020B0604020202020204" pitchFamily="34" charset="0"/>
-              </a:rPr>
-              <a:t> was called but some were not. For example, any grammar changes wont be compiled unless a regen-grammar command is called on the make file. This is something we wish we new early.  If we were to do this project again, we would definitely try to implement some compiler optimizations like constant folding. (ADD SOMETHING ELSE). Looking forward, we would love to try and implement some of existing PEP’s , most notably(PEPS).</a:t>
+              <a:rPr lang="en-US" sz="2400" dirty="0">
+                <a:latin typeface="Arial" panose="020B0604020202020204" pitchFamily="34" charset="0"/>
+                <a:cs typeface="Arial" panose="020B0604020202020204" pitchFamily="34" charset="0"/>
+              </a:rPr>
+              <a:t>The most challenging part of this project was the size and complexity of the code. It was very challenging at first to find what we were looking for and understand how everything in the CPython compiler was connected. This was further magnified by the out of date documentation and heavy use of macros. In hindsight, we didn’t have to write too many lines of code and it was truly a situation of quality over quantity. If we were to do this project again, we would definitely try to implement some compiler optimizations like constant folding. Looking forward, we would love to try and implement some of existing PEP’s , most notably PEP 3124 -</a:t>
+            </a:r>
+            <a:r>
+              <a:rPr lang="en-US" sz="2400" dirty="0"/>
+              <a:t> Overloading, Generic Functions, Interfaces, and Adaptation</a:t>
             </a:r>
           </a:p>
           <a:p>
@@ -4709,55 +4685,7 @@
             </a:endParaRPr>
           </a:p>
           <a:p>
-            <a:endParaRPr lang="en-US" sz="1600" dirty="0">
-              <a:latin typeface="Arial" panose="020B0604020202020204" pitchFamily="34" charset="0"/>
-              <a:cs typeface="Arial" panose="020B0604020202020204" pitchFamily="34" charset="0"/>
-            </a:endParaRPr>
-          </a:p>
-          <a:p>
-            <a:endParaRPr lang="en-US" sz="1600">
-              <a:latin typeface="Arial" panose="020B0604020202020204" pitchFamily="34" charset="0"/>
-              <a:cs typeface="Arial" panose="020B0604020202020204" pitchFamily="34" charset="0"/>
-            </a:endParaRPr>
-          </a:p>
-          <a:p>
-            <a:endParaRPr lang="en-US" sz="1600" dirty="0">
-              <a:latin typeface="Arial" panose="020B0604020202020204" pitchFamily="34" charset="0"/>
-              <a:cs typeface="Arial" panose="020B0604020202020204" pitchFamily="34" charset="0"/>
-            </a:endParaRPr>
-          </a:p>
-          <a:p>
-            <a:endParaRPr lang="en-US" sz="1600" dirty="0">
-              <a:latin typeface="Arial" panose="020B0604020202020204" pitchFamily="34" charset="0"/>
-              <a:cs typeface="Arial" panose="020B0604020202020204" pitchFamily="34" charset="0"/>
-            </a:endParaRPr>
-          </a:p>
-          <a:p>
-            <a:endParaRPr lang="en-US" sz="1600" dirty="0">
-              <a:latin typeface="Arial" panose="020B0604020202020204" pitchFamily="34" charset="0"/>
-              <a:cs typeface="Arial" panose="020B0604020202020204" pitchFamily="34" charset="0"/>
-            </a:endParaRPr>
-          </a:p>
-          <a:p>
-            <a:endParaRPr lang="en-US" sz="1600" dirty="0">
-              <a:latin typeface="Arial" panose="020B0604020202020204" pitchFamily="34" charset="0"/>
-              <a:cs typeface="Arial" panose="020B0604020202020204" pitchFamily="34" charset="0"/>
-            </a:endParaRPr>
-          </a:p>
-          <a:p>
-            <a:endParaRPr lang="en-US" sz="1600" dirty="0">
-              <a:latin typeface="Arial" panose="020B0604020202020204" pitchFamily="34" charset="0"/>
-              <a:cs typeface="Arial" panose="020B0604020202020204" pitchFamily="34" charset="0"/>
-            </a:endParaRPr>
-          </a:p>
-          <a:p>
-            <a:endParaRPr lang="en-US" sz="1600" dirty="0">
-              <a:latin typeface="Arial" panose="020B0604020202020204" pitchFamily="34" charset="0"/>
-              <a:cs typeface="Arial" panose="020B0604020202020204" pitchFamily="34" charset="0"/>
-            </a:endParaRPr>
-          </a:p>
-          <a:p>
-            <a:endParaRPr lang="en-US" sz="1600" dirty="0">
+            <a:endParaRPr lang="en-US" sz="1400" baseline="30000" dirty="0">
               <a:latin typeface="Arial" panose="020B0604020202020204" pitchFamily="34" charset="0"/>
               <a:cs typeface="Arial" panose="020B0604020202020204" pitchFamily="34" charset="0"/>
             </a:endParaRPr>
@@ -4921,8 +4849,8 @@
         </p:nvSpPr>
         <p:spPr bwMode="auto">
           <a:xfrm>
-            <a:off x="16978707" y="4121402"/>
-            <a:ext cx="7072312" cy="1107981"/>
+            <a:off x="16919171" y="4491607"/>
+            <a:ext cx="7072312" cy="430873"/>
           </a:xfrm>
           <a:prstGeom prst="rect">
             <a:avLst/>
@@ -5052,18 +4980,6 @@
             </a:lvl9pPr>
           </a:lstStyle>
           <a:p>
-            <a:endParaRPr lang="en-US" b="1" dirty="0">
-              <a:latin typeface="Arial" panose="020B0604020202020204" pitchFamily="34" charset="0"/>
-              <a:cs typeface="Arial" panose="020B0604020202020204" pitchFamily="34" charset="0"/>
-            </a:endParaRPr>
-          </a:p>
-          <a:p>
-            <a:endParaRPr lang="en-US" sz="2400" b="1" dirty="0">
-              <a:latin typeface="Arial" panose="020B0604020202020204" pitchFamily="34" charset="0"/>
-              <a:cs typeface="Arial" panose="020B0604020202020204" pitchFamily="34" charset="0"/>
-            </a:endParaRPr>
-          </a:p>
-          <a:p>
             <a:r>
               <a:rPr lang="en-US" sz="2400" b="1" dirty="0">
                 <a:latin typeface="Arial" panose="020B0604020202020204" pitchFamily="34" charset="0"/>
@@ -5096,7 +5012,7 @@
         <p:spPr bwMode="auto">
           <a:xfrm>
             <a:off x="8809341" y="4503627"/>
-            <a:ext cx="7377111" cy="11751921"/>
+            <a:ext cx="7377111" cy="12733728"/>
           </a:xfrm>
           <a:prstGeom prst="rect">
             <a:avLst/>
@@ -5231,26 +5147,6 @@
                 <a:spcPct val="110000"/>
               </a:lnSpc>
             </a:pPr>
-            <a:endParaRPr lang="en-US" sz="1800" b="1" dirty="0">
-              <a:latin typeface="Arial" panose="020B0604020202020204" pitchFamily="34" charset="0"/>
-              <a:ea typeface="Open Sans" panose="020B0606030504020204" pitchFamily="34" charset="0"/>
-              <a:cs typeface="Arial" panose="020B0604020202020204" pitchFamily="34" charset="0"/>
-            </a:endParaRPr>
-          </a:p>
-          <a:p>
-            <a:pPr algn="just">
-              <a:lnSpc>
-                <a:spcPct val="110000"/>
-              </a:lnSpc>
-            </a:pPr>
-            <a:r>
-              <a:rPr lang="en-US" sz="1800" b="1" dirty="0">
-                <a:latin typeface="Arial" panose="020B0604020202020204" pitchFamily="34" charset="0"/>
-                <a:ea typeface="Open Sans" panose="020B0606030504020204" pitchFamily="34" charset="0"/>
-                <a:cs typeface="Arial" panose="020B0604020202020204" pitchFamily="34" charset="0"/>
-              </a:rPr>
-              <a:t> </a:t>
-            </a:r>
             <a:r>
               <a:rPr lang="en-US" sz="2400" b="1" dirty="0">
                 <a:latin typeface="Arial" panose="020B0604020202020204" pitchFamily="34" charset="0"/>
@@ -5272,23 +5168,7 @@
                 <a:ea typeface="Open Sans" panose="020B0606030504020204" pitchFamily="34" charset="0"/>
                 <a:cs typeface="Arial" panose="020B0604020202020204" pitchFamily="34" charset="0"/>
               </a:rPr>
-              <a:t>CPython starts with a grammar which is seen below.. Similar modifications were made in the </a:t>
-            </a:r>
-            <a:r>
-              <a:rPr lang="en-US" sz="2400" dirty="0" err="1">
-                <a:latin typeface="Arial" panose="020B0604020202020204" pitchFamily="34" charset="0"/>
-                <a:ea typeface="Open Sans" panose="020B0606030504020204" pitchFamily="34" charset="0"/>
-                <a:cs typeface="Arial" panose="020B0604020202020204" pitchFamily="34" charset="0"/>
-              </a:rPr>
-              <a:t>Python.asdl</a:t>
-            </a:r>
-            <a:r>
-              <a:rPr lang="en-US" sz="2400" dirty="0">
-                <a:latin typeface="Arial" panose="020B0604020202020204" pitchFamily="34" charset="0"/>
-                <a:ea typeface="Open Sans" panose="020B0606030504020204" pitchFamily="34" charset="0"/>
-                <a:cs typeface="Arial" panose="020B0604020202020204" pitchFamily="34" charset="0"/>
-              </a:rPr>
-              <a:t> , which describes the rules.</a:t>
+              <a:t>All CPython modifications started with some grammar rule changes:</a:t>
             </a:r>
           </a:p>
           <a:p>
@@ -5345,40 +5225,29 @@
                 <a:spcPct val="110000"/>
               </a:lnSpc>
             </a:pPr>
-            <a:endParaRPr lang="en-US" sz="2400" dirty="0">
-              <a:latin typeface="Arial" panose="020B0604020202020204" pitchFamily="34" charset="0"/>
-              <a:ea typeface="Open Sans" panose="020B0606030504020204" pitchFamily="34" charset="0"/>
-              <a:cs typeface="Arial" panose="020B0604020202020204" pitchFamily="34" charset="0"/>
-            </a:endParaRPr>
-          </a:p>
-          <a:p>
-            <a:pPr>
-              <a:lnSpc>
-                <a:spcPct val="110000"/>
-              </a:lnSpc>
-            </a:pPr>
-            <a:r>
-              <a:rPr lang="en-US" sz="2400" b="1" dirty="0">
+            <a:r>
+              <a:rPr lang="en-US" sz="2400" dirty="0">
                 <a:latin typeface="Arial" panose="020B0604020202020204" pitchFamily="34" charset="0"/>
                 <a:ea typeface="Open Sans" panose="020B0606030504020204" pitchFamily="34" charset="0"/>
                 <a:cs typeface="Arial" panose="020B0604020202020204" pitchFamily="34" charset="0"/>
               </a:rPr>
-              <a:t>AST MODIFICATIONS</a:t>
-            </a:r>
-          </a:p>
-          <a:p>
-            <a:pPr>
-              <a:lnSpc>
-                <a:spcPct val="110000"/>
-              </a:lnSpc>
-            </a:pPr>
+              <a:t>Similar modifications were made in </a:t>
+            </a:r>
+            <a:r>
+              <a:rPr lang="en-US" sz="2400" dirty="0" err="1">
+                <a:latin typeface="Arial" panose="020B0604020202020204" pitchFamily="34" charset="0"/>
+                <a:ea typeface="Open Sans" panose="020B0606030504020204" pitchFamily="34" charset="0"/>
+                <a:cs typeface="Arial" panose="020B0604020202020204" pitchFamily="34" charset="0"/>
+              </a:rPr>
+              <a:t>Python.asdl</a:t>
+            </a:r>
             <a:r>
               <a:rPr lang="en-US" sz="2400" dirty="0">
                 <a:latin typeface="Arial" panose="020B0604020202020204" pitchFamily="34" charset="0"/>
                 <a:ea typeface="Open Sans" panose="020B0606030504020204" pitchFamily="34" charset="0"/>
                 <a:cs typeface="Arial" panose="020B0604020202020204" pitchFamily="34" charset="0"/>
               </a:rPr>
-              <a:t>Below is an example of the kind of modifications we had to make to allow for 4 different options in a do-while-else loop. Various combinations would allow for various child node configurations which we had to account for, namely:</a:t>
+              <a:t>, which defines the AST nodes</a:t>
             </a:r>
           </a:p>
           <a:p>
@@ -5394,6 +5263,77 @@
             </a:endParaRPr>
           </a:p>
           <a:p>
+            <a:pPr>
+              <a:lnSpc>
+                <a:spcPct val="110000"/>
+              </a:lnSpc>
+            </a:pPr>
+            <a:endParaRPr lang="en-US" sz="2400" dirty="0">
+              <a:latin typeface="Arial" panose="020B0604020202020204" pitchFamily="34" charset="0"/>
+              <a:ea typeface="Open Sans" panose="020B0606030504020204" pitchFamily="34" charset="0"/>
+              <a:cs typeface="Arial" panose="020B0604020202020204" pitchFamily="34" charset="0"/>
+            </a:endParaRPr>
+          </a:p>
+          <a:p>
+            <a:pPr>
+              <a:lnSpc>
+                <a:spcPct val="110000"/>
+              </a:lnSpc>
+            </a:pPr>
+            <a:endParaRPr lang="en-US" sz="2400" dirty="0">
+              <a:latin typeface="Arial" panose="020B0604020202020204" pitchFamily="34" charset="0"/>
+              <a:ea typeface="Open Sans" panose="020B0606030504020204" pitchFamily="34" charset="0"/>
+              <a:cs typeface="Arial" panose="020B0604020202020204" pitchFamily="34" charset="0"/>
+            </a:endParaRPr>
+          </a:p>
+          <a:p>
+            <a:pPr>
+              <a:lnSpc>
+                <a:spcPct val="110000"/>
+              </a:lnSpc>
+            </a:pPr>
+            <a:endParaRPr lang="en-US" sz="2400" dirty="0">
+              <a:latin typeface="Arial" panose="020B0604020202020204" pitchFamily="34" charset="0"/>
+              <a:ea typeface="Open Sans" panose="020B0606030504020204" pitchFamily="34" charset="0"/>
+              <a:cs typeface="Arial" panose="020B0604020202020204" pitchFamily="34" charset="0"/>
+            </a:endParaRPr>
+          </a:p>
+          <a:p>
+            <a:pPr>
+              <a:lnSpc>
+                <a:spcPct val="110000"/>
+              </a:lnSpc>
+            </a:pPr>
+            <a:r>
+              <a:rPr lang="en-US" sz="2400" b="1" dirty="0">
+                <a:latin typeface="Arial" panose="020B0604020202020204" pitchFamily="34" charset="0"/>
+                <a:ea typeface="Open Sans" panose="020B0606030504020204" pitchFamily="34" charset="0"/>
+                <a:cs typeface="Arial" panose="020B0604020202020204" pitchFamily="34" charset="0"/>
+              </a:rPr>
+              <a:t>AST MODIFICATIONS</a:t>
+            </a:r>
+          </a:p>
+          <a:p>
+            <a:pPr>
+              <a:lnSpc>
+                <a:spcPct val="110000"/>
+              </a:lnSpc>
+            </a:pPr>
+            <a:r>
+              <a:rPr lang="en-US" sz="2400" dirty="0">
+                <a:latin typeface="Arial" panose="020B0604020202020204" pitchFamily="34" charset="0"/>
+                <a:ea typeface="Open Sans" panose="020B0606030504020204" pitchFamily="34" charset="0"/>
+                <a:cs typeface="Arial" panose="020B0604020202020204" pitchFamily="34" charset="0"/>
+              </a:rPr>
+              <a:t>Below is an example of the kinds of modifications we had to make to allow for 4 different options in a do-while-else loop. Various combinations would allow for various child node configurations which we had to account for, namely:</a:t>
+            </a:r>
+            <a:endParaRPr lang="en-US" dirty="0">
+              <a:latin typeface="Arial" panose="020B0604020202020204" pitchFamily="34" charset="0"/>
+              <a:ea typeface="Open Sans" panose="020B0606030504020204" pitchFamily="34" charset="0"/>
+              <a:cs typeface="Arial" panose="020B0604020202020204" pitchFamily="34" charset="0"/>
+            </a:endParaRPr>
+          </a:p>
+          <a:p>
             <a:pPr marL="342900" indent="-342900">
               <a:lnSpc>
                 <a:spcPct val="110000"/>
@@ -5402,7 +5342,7 @@
               <a:buChar char="•"/>
             </a:pPr>
             <a:r>
-              <a:rPr lang="en-US" dirty="0">
+              <a:rPr lang="en-US" sz="2200" dirty="0">
                 <a:latin typeface="Arial" panose="020B0604020202020204" pitchFamily="34" charset="0"/>
                 <a:ea typeface="Open Sans" panose="020B0606030504020204" pitchFamily="34" charset="0"/>
                 <a:cs typeface="Arial" panose="020B0604020202020204" pitchFamily="34" charset="0"/>
@@ -5419,12 +5359,12 @@
               <a:buChar char="•"/>
             </a:pPr>
             <a:r>
-              <a:rPr lang="en-US" dirty="0">
+              <a:rPr lang="en-US" sz="2200" dirty="0">
                 <a:latin typeface="Arial" panose="020B0604020202020204" pitchFamily="34" charset="0"/>
                 <a:ea typeface="Open Sans" panose="020B0606030504020204" pitchFamily="34" charset="0"/>
                 <a:cs typeface="Arial" panose="020B0604020202020204" pitchFamily="34" charset="0"/>
               </a:rPr>
-              <a:t>Do While: 7 nodes</a:t>
+              <a:t>Do While: 7 child nodes</a:t>
             </a:r>
           </a:p>
           <a:p>
@@ -5436,12 +5376,12 @@
               <a:buChar char="•"/>
             </a:pPr>
             <a:r>
-              <a:rPr lang="en-US" dirty="0">
+              <a:rPr lang="en-US" sz="2200" dirty="0">
                 <a:latin typeface="Arial" panose="020B0604020202020204" pitchFamily="34" charset="0"/>
                 <a:ea typeface="Open Sans" panose="020B0606030504020204" pitchFamily="34" charset="0"/>
                 <a:cs typeface="Arial" panose="020B0604020202020204" pitchFamily="34" charset="0"/>
               </a:rPr>
-              <a:t>While, Else: 7 nodes</a:t>
+              <a:t>While, Else: 7 child nodes</a:t>
             </a:r>
           </a:p>
           <a:p>
@@ -5453,12 +5393,12 @@
               <a:buChar char="•"/>
             </a:pPr>
             <a:r>
-              <a:rPr lang="en-US" dirty="0">
+              <a:rPr lang="en-US" sz="2200" dirty="0">
                 <a:latin typeface="Arial" panose="020B0604020202020204" pitchFamily="34" charset="0"/>
                 <a:ea typeface="Open Sans" panose="020B0606030504020204" pitchFamily="34" charset="0"/>
                 <a:cs typeface="Arial" panose="020B0604020202020204" pitchFamily="34" charset="0"/>
               </a:rPr>
-              <a:t>Do While Else: 10 nodes</a:t>
+              <a:t>Do While Else: 10 child nodes</a:t>
             </a:r>
           </a:p>
           <a:p>
@@ -5600,7 +5540,7 @@
         <p:spPr bwMode="auto">
           <a:xfrm>
             <a:off x="690589" y="4145241"/>
-            <a:ext cx="7060406" cy="16189033"/>
+            <a:ext cx="7060406" cy="15542702"/>
           </a:xfrm>
           <a:prstGeom prst="rect">
             <a:avLst/>
@@ -5732,6 +5672,15 @@
             </a:endParaRPr>
           </a:p>
           <a:p>
+            <a:r>
+              <a:rPr lang="en-US" sz="2400" dirty="0">
+                <a:latin typeface="Arial" panose="020B0604020202020204" pitchFamily="34" charset="0"/>
+                <a:cs typeface="Arial" panose="020B0604020202020204" pitchFamily="34" charset="0"/>
+              </a:rPr>
+              <a:t>One of the most beloved programming languages out there is Python. It contains a plethora of syntax that enables its users to achieve their goals.  </a:t>
+            </a:r>
+          </a:p>
+          <a:p>
             <a:endParaRPr lang="en-US" sz="2400" dirty="0">
               <a:latin typeface="Arial" panose="020B0604020202020204" pitchFamily="34" charset="0"/>
               <a:cs typeface="Arial" panose="020B0604020202020204" pitchFamily="34" charset="0"/>
@@ -5743,51 +5692,21 @@
                 <a:latin typeface="Arial" panose="020B0604020202020204" pitchFamily="34" charset="0"/>
                 <a:cs typeface="Arial" panose="020B0604020202020204" pitchFamily="34" charset="0"/>
               </a:rPr>
-              <a:t>One of the most beloved programming languages out there is Python. It contains a plethora of syntax that enables its users to achieve their goals.  </a:t>
-            </a:r>
-          </a:p>
-          <a:p>
-            <a:endParaRPr lang="en-US" sz="2400" dirty="0">
-              <a:latin typeface="Arial" panose="020B0604020202020204" pitchFamily="34" charset="0"/>
-              <a:cs typeface="Arial" panose="020B0604020202020204" pitchFamily="34" charset="0"/>
-            </a:endParaRPr>
-          </a:p>
-          <a:p>
+              <a:t>However, it does not contain a handful of syntax that we believe would enrich the programming language and provide developers with more flexibility. These language constructs are </a:t>
+            </a:r>
+            <a:r>
+              <a:rPr lang="en-US" sz="2400" b="1" dirty="0">
+                <a:latin typeface="Arial" panose="020B0604020202020204" pitchFamily="34" charset="0"/>
+                <a:cs typeface="Arial" panose="020B0604020202020204" pitchFamily="34" charset="0"/>
+              </a:rPr>
+              <a:t>Increment, Decrement, Until, Unless, Do-While Loops, &amp; Switch-Case Statements. </a:t>
+            </a:r>
             <a:r>
               <a:rPr lang="en-US" sz="2400" dirty="0">
                 <a:latin typeface="Arial" panose="020B0604020202020204" pitchFamily="34" charset="0"/>
                 <a:cs typeface="Arial" panose="020B0604020202020204" pitchFamily="34" charset="0"/>
               </a:rPr>
-              <a:t>However, it does not contain a handful of syntax that we believe would enrich the programming language and provide developers with more flexibility . </a:t>
-            </a:r>
-          </a:p>
-          <a:p>
-            <a:endParaRPr lang="en-US" sz="2400" dirty="0">
-              <a:latin typeface="Arial" panose="020B0604020202020204" pitchFamily="34" charset="0"/>
-              <a:cs typeface="Arial" panose="020B0604020202020204" pitchFamily="34" charset="0"/>
-            </a:endParaRPr>
-          </a:p>
-          <a:p>
-            <a:r>
-              <a:rPr lang="en-US" sz="2400" dirty="0">
-                <a:latin typeface="Arial" panose="020B0604020202020204" pitchFamily="34" charset="0"/>
-                <a:cs typeface="Arial" panose="020B0604020202020204" pitchFamily="34" charset="0"/>
-              </a:rPr>
-              <a:t>The language constructs we believe will ameliorate Python are : </a:t>
-            </a:r>
-            <a:r>
-              <a:rPr lang="en-US" sz="2400" b="1" dirty="0">
-                <a:latin typeface="Arial" panose="020B0604020202020204" pitchFamily="34" charset="0"/>
-                <a:cs typeface="Arial" panose="020B0604020202020204" pitchFamily="34" charset="0"/>
-              </a:rPr>
-              <a:t>Increment, Decrement,  Until , Unless, Do-While Loops, &amp; Switch-Case Statements. </a:t>
-            </a:r>
-            <a:r>
-              <a:rPr lang="en-US" sz="2400" dirty="0">
-                <a:latin typeface="Arial" panose="020B0604020202020204" pitchFamily="34" charset="0"/>
-                <a:cs typeface="Arial" panose="020B0604020202020204" pitchFamily="34" charset="0"/>
-              </a:rPr>
-              <a:t>These enhancements, although not necessarily pythonic, would enhance the toolkit for developers. </a:t>
+              <a:t>These enhancements, although not necessarily pythonic, would undoubtedly strengthen a developers toolkit. </a:t>
             </a:r>
           </a:p>
           <a:p>
@@ -6049,7 +5968,7 @@
                 <a:ea typeface="+mn-ea"/>
                 <a:cs typeface="Arial" panose="020B0604020202020204" pitchFamily="34" charset="0"/>
               </a:rPr>
-              <a:t>Ceval.c</a:t>
+              <a:t>ceval.c</a:t>
             </a:r>
             <a:r>
               <a:rPr lang="en-US" sz="2200" dirty="0">
@@ -6086,6 +6005,12 @@
               </a:rPr>
               <a:t>Generates a symbol table from AST</a:t>
             </a:r>
+          </a:p>
+          <a:p>
+            <a:pPr marL="342900" indent="-342900">
+              <a:buFont typeface="Arial" panose="020B0604020202020204" pitchFamily="34" charset="0"/>
+              <a:buChar char="•"/>
+            </a:pPr>
             <a:endParaRPr lang="en-US" sz="2200" dirty="0">
               <a:latin typeface="Arial" panose="020B0604020202020204" pitchFamily="34" charset="0"/>
               <a:ea typeface="+mn-ea"/>
@@ -6093,28 +6018,62 @@
             </a:endParaRPr>
           </a:p>
           <a:p>
-            <a:pPr marL="457200" indent="-457200">
-              <a:buFont typeface="+mj-lt"/>
-              <a:buAutoNum type="arabicPeriod"/>
-            </a:pPr>
-            <a:endParaRPr lang="en-US" sz="2400" dirty="0">
-              <a:latin typeface="Arial" panose="020B0604020202020204" pitchFamily="34" charset="0"/>
-              <a:ea typeface="+mn-ea"/>
-              <a:cs typeface="Arial" panose="020B0604020202020204" pitchFamily="34" charset="0"/>
-            </a:endParaRPr>
-          </a:p>
-          <a:p>
-            <a:endParaRPr lang="en-US" sz="2400" b="1" dirty="0">
-              <a:latin typeface="Arial" panose="020B0604020202020204" pitchFamily="34" charset="0"/>
-              <a:ea typeface="+mn-ea"/>
-              <a:cs typeface="Arial" panose="020B0604020202020204" pitchFamily="34" charset="0"/>
-            </a:endParaRPr>
-          </a:p>
-          <a:p>
-            <a:pPr marL="342900" indent="-342900">
-              <a:buFont typeface="+mj-lt"/>
-              <a:buAutoNum type="arabicPeriod"/>
-            </a:pPr>
+            <a:r>
+              <a:rPr lang="en-US" sz="2400" dirty="0">
+                <a:latin typeface="Arial" panose="020B0604020202020204" pitchFamily="34" charset="0"/>
+                <a:ea typeface="+mn-ea"/>
+                <a:cs typeface="Arial" panose="020B0604020202020204" pitchFamily="34" charset="0"/>
+              </a:rPr>
+              <a:t>Following these changes, running a configured </a:t>
+            </a:r>
+            <a:r>
+              <a:rPr lang="en-US" sz="2400" dirty="0" err="1">
+                <a:latin typeface="Arial" panose="020B0604020202020204" pitchFamily="34" charset="0"/>
+                <a:ea typeface="+mn-ea"/>
+                <a:cs typeface="Arial" panose="020B0604020202020204" pitchFamily="34" charset="0"/>
+              </a:rPr>
+              <a:t>Makefile</a:t>
+            </a:r>
+            <a:r>
+              <a:rPr lang="en-US" sz="2400" dirty="0">
+                <a:latin typeface="Arial" panose="020B0604020202020204" pitchFamily="34" charset="0"/>
+                <a:ea typeface="+mn-ea"/>
+                <a:cs typeface="Arial" panose="020B0604020202020204" pitchFamily="34" charset="0"/>
+              </a:rPr>
+              <a:t> regenerated the remaining necessary source code such including </a:t>
+            </a:r>
+            <a:r>
+              <a:rPr lang="en-US" sz="2400" dirty="0" err="1">
+                <a:latin typeface="Arial" panose="020B0604020202020204" pitchFamily="34" charset="0"/>
+                <a:ea typeface="+mn-ea"/>
+                <a:cs typeface="Arial" panose="020B0604020202020204" pitchFamily="34" charset="0"/>
+              </a:rPr>
+              <a:t>graminit.c</a:t>
+            </a:r>
+            <a:r>
+              <a:rPr lang="en-US" sz="2400" dirty="0">
+                <a:latin typeface="Arial" panose="020B0604020202020204" pitchFamily="34" charset="0"/>
+                <a:ea typeface="+mn-ea"/>
+                <a:cs typeface="Arial" panose="020B0604020202020204" pitchFamily="34" charset="0"/>
+              </a:rPr>
+              <a:t>  and </a:t>
+            </a:r>
+            <a:r>
+              <a:rPr lang="en-US" sz="2400" dirty="0" err="1">
+                <a:latin typeface="Arial" panose="020B0604020202020204" pitchFamily="34" charset="0"/>
+                <a:ea typeface="+mn-ea"/>
+                <a:cs typeface="Arial" panose="020B0604020202020204" pitchFamily="34" charset="0"/>
+              </a:rPr>
+              <a:t>node.h</a:t>
+            </a:r>
+            <a:r>
+              <a:rPr lang="en-US" sz="2400" dirty="0">
+                <a:latin typeface="Arial" panose="020B0604020202020204" pitchFamily="34" charset="0"/>
+                <a:ea typeface="+mn-ea"/>
+                <a:cs typeface="Arial" panose="020B0604020202020204" pitchFamily="34" charset="0"/>
+              </a:rPr>
+              <a:t>. </a:t>
+            </a:r>
             <a:endParaRPr lang="en-US" sz="1600" b="1" dirty="0">
               <a:latin typeface="Arial" panose="020B0604020202020204" pitchFamily="34" charset="0"/>
               <a:ea typeface="+mn-ea"/>
@@ -6682,7 +6641,7 @@
         </p:nvSpPr>
         <p:spPr>
           <a:xfrm>
-            <a:off x="731044" y="10772421"/>
+            <a:off x="678683" y="9195607"/>
             <a:ext cx="7072312" cy="649188"/>
           </a:xfrm>
           <a:prstGeom prst="round2DiagRect">
@@ -6991,7 +6950,7 @@
         </p:blipFill>
         <p:spPr>
           <a:xfrm>
-            <a:off x="27572654" y="150544"/>
+            <a:off x="26855818" y="143385"/>
             <a:ext cx="3590763" cy="3590763"/>
           </a:xfrm>
           <a:prstGeom prst="rect">
@@ -7027,8 +6986,8 @@
         </p:blipFill>
         <p:spPr>
           <a:xfrm>
-            <a:off x="1224915" y="699749"/>
-            <a:ext cx="4975860" cy="2735711"/>
+            <a:off x="1130385" y="637347"/>
+            <a:ext cx="5318148" cy="2923900"/>
           </a:xfrm>
           <a:prstGeom prst="rect">
             <a:avLst/>
@@ -7096,12 +7055,22 @@
         </p:blipFill>
         <p:spPr>
           <a:xfrm>
-            <a:off x="8820916" y="6547277"/>
-            <a:ext cx="7394836" cy="1362774"/>
+            <a:off x="8884127" y="5825517"/>
+            <a:ext cx="7227538" cy="1331943"/>
           </a:xfrm>
           <a:prstGeom prst="rect">
             <a:avLst/>
           </a:prstGeom>
+          <a:ln>
+            <a:noFill/>
+          </a:ln>
+          <a:effectLst>
+            <a:outerShdw blurRad="292100" dist="139700" dir="2700000" algn="tl" rotWithShape="0">
+              <a:srgbClr val="333333">
+                <a:alpha val="65000"/>
+              </a:srgbClr>
+            </a:outerShdw>
+          </a:effectLst>
         </p:spPr>
       </p:pic>
       <p:pic>
@@ -7126,12 +7095,24 @@
         </p:blipFill>
         <p:spPr>
           <a:xfrm>
-            <a:off x="8884820" y="12914354"/>
+            <a:off x="8851075" y="13725138"/>
             <a:ext cx="7574380" cy="5674697"/>
           </a:xfrm>
           <a:prstGeom prst="rect">
             <a:avLst/>
           </a:prstGeom>
+          <a:ln>
+            <a:solidFill>
+              <a:srgbClr val="346E9D"/>
+            </a:solidFill>
+          </a:ln>
+          <a:effectLst>
+            <a:outerShdw blurRad="292100" dist="139700" dir="2700000" algn="tl" rotWithShape="0">
+              <a:srgbClr val="333333">
+                <a:alpha val="65000"/>
+              </a:srgbClr>
+            </a:outerShdw>
+          </a:effectLst>
         </p:spPr>
       </p:pic>
       <p:pic>
@@ -7156,12 +7137,24 @@
         </p:blipFill>
         <p:spPr>
           <a:xfrm>
-            <a:off x="19562080" y="5730074"/>
+            <a:off x="19589231" y="5109053"/>
             <a:ext cx="4566803" cy="6772275"/>
           </a:xfrm>
           <a:prstGeom prst="rect">
             <a:avLst/>
           </a:prstGeom>
+          <a:ln>
+            <a:solidFill>
+              <a:srgbClr val="346E9D"/>
+            </a:solidFill>
+          </a:ln>
+          <a:effectLst>
+            <a:outerShdw blurRad="292100" dist="139700" dir="2700000" algn="tl" rotWithShape="0">
+              <a:srgbClr val="333333">
+                <a:alpha val="65000"/>
+              </a:srgbClr>
+            </a:outerShdw>
+          </a:effectLst>
         </p:spPr>
       </p:pic>
       <p:sp>
@@ -7178,8 +7171,8 @@
         </p:nvSpPr>
         <p:spPr>
           <a:xfrm>
-            <a:off x="16983076" y="5730074"/>
-            <a:ext cx="2561279" cy="7109639"/>
+            <a:off x="16890171" y="4892634"/>
+            <a:ext cx="2699060" cy="7109639"/>
           </a:xfrm>
           <a:prstGeom prst="rect">
             <a:avLst/>
@@ -7197,7 +7190,7 @@
                 <a:latin typeface="Arial" panose="020B0604020202020204" pitchFamily="34" charset="0"/>
                 <a:cs typeface="Arial" panose="020B0604020202020204" pitchFamily="34" charset="0"/>
               </a:rPr>
-              <a:t>The code on the right demonstrates the code that had to be created in order to compile the AST to bytecode. The bytecode is handled via several macros. There are also various helper functions like </a:t>
+              <a:t>The implementation  on the right demonstrates the code needed in order to compile the AST to bytecode. The bytecode is handled via several macros. There are also various helper functions like </a:t>
             </a:r>
             <a:r>
               <a:rPr lang="en-CA" sz="2400" dirty="0" err="1">
@@ -7230,7 +7223,7 @@
         </p:nvSpPr>
         <p:spPr>
           <a:xfrm>
-            <a:off x="16983076" y="13170976"/>
+            <a:off x="16962026" y="12407503"/>
             <a:ext cx="7353962" cy="4154984"/>
           </a:xfrm>
           <a:prstGeom prst="rect">
@@ -7260,7 +7253,7 @@
                 <a:ea typeface="Open Sans" panose="020B0606030504020204" pitchFamily="34" charset="0"/>
                 <a:cs typeface="Arial" panose="020B0604020202020204" pitchFamily="34" charset="0"/>
               </a:rPr>
-              <a:t>Parsing tokens like increment and decrement required additional changes to </a:t>
+              <a:t>Parsing tokens like increment and decrement required additional changes to tokenizer.c and </a:t>
             </a:r>
             <a:r>
               <a:rPr lang="en-US" sz="2400" dirty="0" err="1">
@@ -7268,7 +7261,7 @@
                 <a:ea typeface="Open Sans" panose="020B0606030504020204" pitchFamily="34" charset="0"/>
                 <a:cs typeface="Arial" panose="020B0604020202020204" pitchFamily="34" charset="0"/>
               </a:rPr>
-              <a:t>tokenizer.c</a:t>
+              <a:t>token.h</a:t>
             </a:r>
             <a:r>
               <a:rPr lang="en-US" sz="2400" dirty="0">
@@ -7276,23 +7269,7 @@
                 <a:ea typeface="Open Sans" panose="020B0606030504020204" pitchFamily="34" charset="0"/>
                 <a:cs typeface="Arial" panose="020B0604020202020204" pitchFamily="34" charset="0"/>
               </a:rPr>
-              <a:t> and </a:t>
-            </a:r>
-            <a:r>
-              <a:rPr lang="en-US" sz="2400" dirty="0" err="1">
-                <a:latin typeface="Arial" panose="020B0604020202020204" pitchFamily="34" charset="0"/>
-                <a:ea typeface="Open Sans" panose="020B0606030504020204" pitchFamily="34" charset="0"/>
-                <a:cs typeface="Arial" panose="020B0604020202020204" pitchFamily="34" charset="0"/>
-              </a:rPr>
-              <a:t>token.h</a:t>
-            </a:r>
-            <a:r>
-              <a:rPr lang="en-US" sz="2400" dirty="0">
-                <a:latin typeface="Arial" panose="020B0604020202020204" pitchFamily="34" charset="0"/>
-                <a:ea typeface="Open Sans" panose="020B0606030504020204" pitchFamily="34" charset="0"/>
-                <a:cs typeface="Arial" panose="020B0604020202020204" pitchFamily="34" charset="0"/>
-              </a:rPr>
-              <a:t>. We defined them and had to specially handle them since they were a double token. As seen in the switch case statement below, after first checking for the ‘+’ symbol, a following check for the same symbol is done such that the appropriate call is made. </a:t>
+              <a:t>. We explicitly defined and handled them since they represented a double token. As seen in the switch case statement below, after first checking for the ‘+’ or ‘-’ symbol, a following check for the same symbol is done such that the appropriate call to increment/ decrement is made. </a:t>
             </a:r>
           </a:p>
           <a:p>
@@ -7333,12 +7310,24 @@
         </p:blipFill>
         <p:spPr>
           <a:xfrm>
-            <a:off x="17128326" y="16695950"/>
+            <a:off x="17153038" y="15942271"/>
             <a:ext cx="6927062" cy="3990835"/>
           </a:xfrm>
           <a:prstGeom prst="rect">
             <a:avLst/>
           </a:prstGeom>
+          <a:ln>
+            <a:solidFill>
+              <a:srgbClr val="346E9D"/>
+            </a:solidFill>
+          </a:ln>
+          <a:effectLst>
+            <a:outerShdw blurRad="292100" dist="139700" dir="2700000" algn="tl" rotWithShape="0">
+              <a:srgbClr val="333333">
+                <a:alpha val="65000"/>
+              </a:srgbClr>
+            </a:outerShdw>
+          </a:effectLst>
         </p:spPr>
       </p:pic>
       <p:sp>
@@ -7408,6 +7397,46 @@
           </a:p>
         </p:txBody>
       </p:sp>
+      <p:pic>
+        <p:nvPicPr>
+          <p:cNvPr id="2" name="Picture 1">
+            <a:extLst>
+              <a:ext uri="{FF2B5EF4-FFF2-40B4-BE49-F238E27FC236}">
+                <a16:creationId xmlns:a16="http://schemas.microsoft.com/office/drawing/2014/main" id="{0D0E5987-3E34-4513-B27F-28B582239582}"/>
+              </a:ext>
+            </a:extLst>
+          </p:cNvPr>
+          <p:cNvPicPr>
+            <a:picLocks noChangeAspect="1"/>
+          </p:cNvPicPr>
+          <p:nvPr/>
+        </p:nvPicPr>
+        <p:blipFill>
+          <a:blip r:embed="rId14"/>
+          <a:stretch>
+            <a:fillRect/>
+          </a:stretch>
+        </p:blipFill>
+        <p:spPr>
+          <a:xfrm>
+            <a:off x="8809341" y="8409860"/>
+            <a:ext cx="7301990" cy="937655"/>
+          </a:xfrm>
+          <a:prstGeom prst="rect">
+            <a:avLst/>
+          </a:prstGeom>
+          <a:ln>
+            <a:noFill/>
+          </a:ln>
+          <a:effectLst>
+            <a:outerShdw blurRad="292100" dist="139700" dir="2700000" algn="tl" rotWithShape="0">
+              <a:srgbClr val="333333">
+                <a:alpha val="65000"/>
+              </a:srgbClr>
+            </a:outerShdw>
+          </a:effectLst>
+        </p:spPr>
+      </p:pic>
     </p:spTree>
     <p:extLst>
       <p:ext uri="{BB962C8B-B14F-4D97-AF65-F5344CB8AC3E}">

</xml_diff>

<commit_message>
Poster final touch ups
</commit_message>
<xml_diff>
--- a/Doc/Poster/poster.pptx
+++ b/Doc/Poster/poster.pptx
@@ -151,7 +151,7 @@
 
 <file path=ppt/commentAuthors.xml><?xml version="1.0" encoding="utf-8"?>
 <p:cmAuthorLst xmlns:a="http://schemas.openxmlformats.org/drawingml/2006/main" xmlns:r="http://schemas.openxmlformats.org/officeDocument/2006/relationships" xmlns:p="http://schemas.openxmlformats.org/presentationml/2006/main">
-  <p:cmAuthor id="1" name="Prin Selva" initials="PS" lastIdx="1" clrIdx="0">
+  <p:cmAuthor id="1" name="Prin Selva" initials="PS" lastIdx="2" clrIdx="0">
     <p:extLst>
       <p:ext uri="{19B8F6BF-5375-455C-9EA6-DF929625EA0E}">
         <p15:presenceInfo xmlns:p15="http://schemas.microsoft.com/office/powerpoint/2012/main" userId="Prin Selva" providerId="None"/>
@@ -249,7 +249,7 @@
           <a:p>
             <a:fld id="{302F586B-0015-43FB-918D-31E1A09780E3}" type="datetimeFigureOut">
               <a:rPr lang="en-US" smtClean="0"/>
-              <a:t>4/15/19</a:t>
+              <a:t>4/15/2019</a:t>
             </a:fld>
             <a:endParaRPr lang="en-US"/>
           </a:p>
@@ -426,7 +426,7 @@
           <a:p>
             <a:fld id="{7CEAF96C-0DD1-4DCA-AB4B-687076CBD6E7}" type="datetimeFigureOut">
               <a:rPr lang="en-US" smtClean="0"/>
-              <a:t>4/15/19</a:t>
+              <a:t>4/15/2019</a:t>
             </a:fld>
             <a:endParaRPr lang="en-US"/>
           </a:p>
@@ -1217,7 +1217,7 @@
           <a:p>
             <a:fld id="{1D3EE5B7-680E-44FF-962F-3113FAB5030E}" type="datetimeFigureOut">
               <a:rPr lang="en-US" smtClean="0"/>
-              <a:t>4/15/19</a:t>
+              <a:t>4/15/2019</a:t>
             </a:fld>
             <a:endParaRPr lang="en-US"/>
           </a:p>
@@ -1416,7 +1416,7 @@
           <a:p>
             <a:fld id="{1D3EE5B7-680E-44FF-962F-3113FAB5030E}" type="datetimeFigureOut">
               <a:rPr lang="en-US" smtClean="0"/>
-              <a:t>4/15/19</a:t>
+              <a:t>4/15/2019</a:t>
             </a:fld>
             <a:endParaRPr lang="en-US"/>
           </a:p>
@@ -1605,7 +1605,7 @@
           <a:p>
             <a:fld id="{1D3EE5B7-680E-44FF-962F-3113FAB5030E}" type="datetimeFigureOut">
               <a:rPr lang="en-US" smtClean="0"/>
-              <a:t>4/15/19</a:t>
+              <a:t>4/15/2019</a:t>
             </a:fld>
             <a:endParaRPr lang="en-US"/>
           </a:p>
@@ -1869,7 +1869,7 @@
           <a:p>
             <a:fld id="{1D3EE5B7-680E-44FF-962F-3113FAB5030E}" type="datetimeFigureOut">
               <a:rPr lang="en-US" smtClean="0"/>
-              <a:t>4/15/19</a:t>
+              <a:t>4/15/2019</a:t>
             </a:fld>
             <a:endParaRPr lang="en-US"/>
           </a:p>
@@ -2177,7 +2177,7 @@
           <a:p>
             <a:fld id="{1D3EE5B7-680E-44FF-962F-3113FAB5030E}" type="datetimeFigureOut">
               <a:rPr lang="en-US" smtClean="0"/>
-              <a:t>4/15/19</a:t>
+              <a:t>4/15/2019</a:t>
             </a:fld>
             <a:endParaRPr lang="en-US"/>
           </a:p>
@@ -2624,7 +2624,7 @@
           <a:p>
             <a:fld id="{1D3EE5B7-680E-44FF-962F-3113FAB5030E}" type="datetimeFigureOut">
               <a:rPr lang="en-US" smtClean="0"/>
-              <a:t>4/15/19</a:t>
+              <a:t>4/15/2019</a:t>
             </a:fld>
             <a:endParaRPr lang="en-US"/>
           </a:p>
@@ -2758,7 +2758,7 @@
           <a:p>
             <a:fld id="{1D3EE5B7-680E-44FF-962F-3113FAB5030E}" type="datetimeFigureOut">
               <a:rPr lang="en-US" smtClean="0"/>
-              <a:t>4/15/19</a:t>
+              <a:t>4/15/2019</a:t>
             </a:fld>
             <a:endParaRPr lang="en-US"/>
           </a:p>
@@ -2866,7 +2866,7 @@
           <a:p>
             <a:fld id="{1D3EE5B7-680E-44FF-962F-3113FAB5030E}" type="datetimeFigureOut">
               <a:rPr lang="en-US" smtClean="0"/>
-              <a:t>4/15/19</a:t>
+              <a:t>4/15/2019</a:t>
             </a:fld>
             <a:endParaRPr lang="en-US"/>
           </a:p>
@@ -3163,7 +3163,7 @@
           <a:p>
             <a:fld id="{1D3EE5B7-680E-44FF-962F-3113FAB5030E}" type="datetimeFigureOut">
               <a:rPr lang="en-US" smtClean="0"/>
-              <a:t>4/15/19</a:t>
+              <a:t>4/15/2019</a:t>
             </a:fld>
             <a:endParaRPr lang="en-US"/>
           </a:p>
@@ -3437,7 +3437,7 @@
           <a:p>
             <a:fld id="{1D3EE5B7-680E-44FF-962F-3113FAB5030E}" type="datetimeFigureOut">
               <a:rPr lang="en-US" smtClean="0"/>
-              <a:t>4/15/19</a:t>
+              <a:t>4/15/2019</a:t>
             </a:fld>
             <a:endParaRPr lang="en-US"/>
           </a:p>
@@ -3668,7 +3668,7 @@
           <a:p>
             <a:fld id="{1D3EE5B7-680E-44FF-962F-3113FAB5030E}" type="datetimeFigureOut">
               <a:rPr lang="en-US" smtClean="0"/>
-              <a:t>4/15/19</a:t>
+              <a:t>4/15/2019</a:t>
             </a:fld>
             <a:endParaRPr lang="en-US"/>
           </a:p>
@@ -4277,7 +4277,7 @@
         </p:nvSpPr>
         <p:spPr bwMode="auto">
           <a:xfrm>
-            <a:off x="25091563" y="4359999"/>
+            <a:off x="25063253" y="4172431"/>
             <a:ext cx="7072312" cy="17225214"/>
           </a:xfrm>
           <a:prstGeom prst="rect">
@@ -4408,170 +4408,129 @@
             </a:lvl9pPr>
           </a:lstStyle>
           <a:p>
+            <a:endParaRPr lang="en-US" sz="2400" b="1" dirty="0">
+              <a:latin typeface="Arial" panose="020B0604020202020204" pitchFamily="34" charset="0"/>
+              <a:cs typeface="Arial" panose="020B0604020202020204" pitchFamily="34" charset="0"/>
+            </a:endParaRPr>
+          </a:p>
+          <a:p>
+            <a:r>
+              <a:rPr lang="en-US" sz="2400" b="1" dirty="0">
+                <a:latin typeface="Arial" panose="020B0604020202020204" pitchFamily="34" charset="0"/>
+                <a:cs typeface="Arial" panose="020B0604020202020204" pitchFamily="34" charset="0"/>
+              </a:rPr>
+              <a:t>OUTPUT FROM TEST CASES</a:t>
+            </a:r>
+            <a:endParaRPr lang="en-US" sz="1600" b="1" dirty="0">
+              <a:latin typeface="Arial" panose="020B0604020202020204" pitchFamily="34" charset="0"/>
+              <a:cs typeface="Arial" panose="020B0604020202020204" pitchFamily="34" charset="0"/>
+            </a:endParaRPr>
+          </a:p>
+          <a:p>
+            <a:endParaRPr lang="en-US" sz="2400" b="1" dirty="0">
+              <a:latin typeface="Arial" panose="020B0604020202020204" pitchFamily="34" charset="0"/>
+              <a:cs typeface="Arial" panose="020B0604020202020204" pitchFamily="34" charset="0"/>
+            </a:endParaRPr>
+          </a:p>
+          <a:p>
+            <a:r>
+              <a:rPr lang="en-US" sz="2400" b="1" dirty="0">
+                <a:latin typeface="Arial" panose="020B0604020202020204" pitchFamily="34" charset="0"/>
+                <a:cs typeface="Arial" panose="020B0604020202020204" pitchFamily="34" charset="0"/>
+              </a:rPr>
+              <a:t>Increment/ Decrement  </a:t>
+            </a:r>
+          </a:p>
+          <a:p>
+            <a:r>
+              <a:rPr lang="en-US" sz="2200" i="1" dirty="0"/>
+              <a:t>Increment and decrement </a:t>
+            </a:r>
+            <a:r>
+              <a:rPr lang="en-US" sz="2200" i="1" dirty="0" err="1"/>
+              <a:t>oper</a:t>
+            </a:r>
+            <a:r>
+              <a:rPr lang="en-US" sz="2200" i="1" dirty="0"/>
+              <a:t>-</a:t>
+            </a:r>
+          </a:p>
+          <a:p>
+            <a:r>
+              <a:rPr lang="en-US" sz="2200" i="1" dirty="0" err="1"/>
+              <a:t>ators</a:t>
+            </a:r>
+            <a:r>
+              <a:rPr lang="en-US" sz="2200" i="1" dirty="0"/>
+              <a:t> are unary operators that </a:t>
+            </a:r>
+          </a:p>
+          <a:p>
+            <a:r>
+              <a:rPr lang="en-US" sz="2200" i="1" dirty="0"/>
+              <a:t>add or subtract one from their </a:t>
+            </a:r>
+          </a:p>
+          <a:p>
+            <a:r>
+              <a:rPr lang="en-US" sz="2200" i="1" dirty="0"/>
+              <a:t>operand, respectively.</a:t>
+            </a:r>
+            <a:endParaRPr lang="en-US" sz="2200" b="1" i="1" dirty="0">
+              <a:latin typeface="Arial" panose="020B0604020202020204" pitchFamily="34" charset="0"/>
+              <a:cs typeface="Arial" panose="020B0604020202020204" pitchFamily="34" charset="0"/>
+            </a:endParaRPr>
+          </a:p>
+          <a:p>
+            <a:endParaRPr lang="en-US" sz="2400" b="1" dirty="0">
+              <a:latin typeface="Arial" panose="020B0604020202020204" pitchFamily="34" charset="0"/>
+              <a:cs typeface="Arial" panose="020B0604020202020204" pitchFamily="34" charset="0"/>
+            </a:endParaRPr>
+          </a:p>
+          <a:p>
+            <a:r>
+              <a:rPr lang="en-US" sz="2400" b="1" dirty="0">
+                <a:latin typeface="Arial" panose="020B0604020202020204" pitchFamily="34" charset="0"/>
+                <a:cs typeface="Arial" panose="020B0604020202020204" pitchFamily="34" charset="0"/>
+              </a:rPr>
+              <a:t>Until</a:t>
+            </a:r>
+          </a:p>
+          <a:p>
+            <a:r>
+              <a:rPr lang="en-US" sz="2200" i="1" dirty="0"/>
+              <a:t>An until loop statement</a:t>
+            </a:r>
+          </a:p>
+          <a:p>
+            <a:r>
+              <a:rPr lang="en-US" sz="2200" i="1" dirty="0"/>
+              <a:t>repeatedly executes a target </a:t>
+            </a:r>
+          </a:p>
+          <a:p>
+            <a:r>
+              <a:rPr lang="en-US" sz="2200" i="1" dirty="0"/>
+              <a:t>statement as long as a given </a:t>
+            </a:r>
+          </a:p>
+          <a:p>
+            <a:r>
+              <a:rPr lang="en-US" sz="2200" i="1" dirty="0"/>
+              <a:t>condition is false.</a:t>
+            </a:r>
+            <a:endParaRPr lang="en-US" sz="2200" i="1" dirty="0">
+              <a:latin typeface="Arial" panose="020B0604020202020204" pitchFamily="34" charset="0"/>
+              <a:cs typeface="Arial" panose="020B0604020202020204" pitchFamily="34" charset="0"/>
+            </a:endParaRPr>
+          </a:p>
+          <a:p>
             <a:endParaRPr lang="en-US" sz="1600" dirty="0">
               <a:latin typeface="Arial" panose="020B0604020202020204" pitchFamily="34" charset="0"/>
               <a:cs typeface="Arial" panose="020B0604020202020204" pitchFamily="34" charset="0"/>
             </a:endParaRPr>
           </a:p>
           <a:p>
-            <a:r>
-              <a:rPr lang="en-US" sz="1600" b="1" dirty="0">
-                <a:latin typeface="Arial" panose="020B0604020202020204" pitchFamily="34" charset="0"/>
-                <a:cs typeface="Arial" panose="020B0604020202020204" pitchFamily="34" charset="0"/>
-              </a:rPr>
-              <a:t>DEVELOPMENT STATISTICS </a:t>
-            </a:r>
-          </a:p>
-          <a:p>
-            <a:endParaRPr lang="en-US" sz="1600" b="1" dirty="0">
-              <a:latin typeface="Arial" panose="020B0604020202020204" pitchFamily="34" charset="0"/>
-              <a:cs typeface="Arial" panose="020B0604020202020204" pitchFamily="34" charset="0"/>
-            </a:endParaRPr>
-          </a:p>
-          <a:p>
-            <a:r>
-              <a:rPr lang="en-US" sz="1600" b="1" dirty="0">
-                <a:latin typeface="Arial" panose="020B0604020202020204" pitchFamily="34" charset="0"/>
-                <a:cs typeface="Arial" panose="020B0604020202020204" pitchFamily="34" charset="0"/>
-              </a:rPr>
-              <a:t>Modifications:</a:t>
-            </a:r>
-          </a:p>
-          <a:p>
-            <a:r>
-              <a:rPr lang="en-US" sz="1600" b="1" dirty="0">
-                <a:latin typeface="Arial" panose="020B0604020202020204" pitchFamily="34" charset="0"/>
-                <a:cs typeface="Arial" panose="020B0604020202020204" pitchFamily="34" charset="0"/>
-              </a:rPr>
-              <a:t>Files:</a:t>
-            </a:r>
-          </a:p>
-          <a:p>
-            <a:r>
-              <a:rPr lang="en-US" sz="1600" b="1" dirty="0">
-                <a:latin typeface="Arial" panose="020B0604020202020204" pitchFamily="34" charset="0"/>
-                <a:cs typeface="Arial" panose="020B0604020202020204" pitchFamily="34" charset="0"/>
-              </a:rPr>
-              <a:t>Lines:</a:t>
-            </a:r>
-          </a:p>
-          <a:p>
-            <a:endParaRPr lang="en-US" sz="1600" b="1" dirty="0">
-              <a:latin typeface="Arial" panose="020B0604020202020204" pitchFamily="34" charset="0"/>
-              <a:cs typeface="Arial" panose="020B0604020202020204" pitchFamily="34" charset="0"/>
-            </a:endParaRPr>
-          </a:p>
-          <a:p>
-            <a:r>
-              <a:rPr lang="en-US" sz="1600" b="1" dirty="0">
-                <a:latin typeface="Arial" panose="020B0604020202020204" pitchFamily="34" charset="0"/>
-                <a:cs typeface="Arial" panose="020B0604020202020204" pitchFamily="34" charset="0"/>
-              </a:rPr>
-              <a:t>EXAMPLE OUTPUT FROM TEST CASES:</a:t>
-            </a:r>
-          </a:p>
-          <a:p>
-            <a:endParaRPr lang="en-US" sz="1600" b="1" dirty="0">
-              <a:latin typeface="Arial" panose="020B0604020202020204" pitchFamily="34" charset="0"/>
-              <a:cs typeface="Arial" panose="020B0604020202020204" pitchFamily="34" charset="0"/>
-            </a:endParaRPr>
-          </a:p>
-          <a:p>
-            <a:r>
-              <a:rPr lang="en-US" sz="1600" b="1" dirty="0">
-                <a:latin typeface="Arial" panose="020B0604020202020204" pitchFamily="34" charset="0"/>
-                <a:cs typeface="Arial" panose="020B0604020202020204" pitchFamily="34" charset="0"/>
-              </a:rPr>
-              <a:t>Increment/ Decrement  </a:t>
-            </a:r>
-          </a:p>
-          <a:p>
-            <a:endParaRPr lang="en-US" sz="1600" b="1" dirty="0">
-              <a:latin typeface="Arial" panose="020B0604020202020204" pitchFamily="34" charset="0"/>
-              <a:cs typeface="Arial" panose="020B0604020202020204" pitchFamily="34" charset="0"/>
-            </a:endParaRPr>
-          </a:p>
-          <a:p>
-            <a:endParaRPr lang="en-US" sz="1600" b="1" dirty="0">
-              <a:latin typeface="Arial" panose="020B0604020202020204" pitchFamily="34" charset="0"/>
-              <a:cs typeface="Arial" panose="020B0604020202020204" pitchFamily="34" charset="0"/>
-            </a:endParaRPr>
-          </a:p>
-          <a:p>
-            <a:pPr algn="ctr"/>
-            <a:r>
-              <a:rPr lang="en-US" sz="1600" i="1" dirty="0">
-                <a:latin typeface="Arial" panose="020B0604020202020204" pitchFamily="34" charset="0"/>
-                <a:cs typeface="Arial" panose="020B0604020202020204" pitchFamily="34" charset="0"/>
-              </a:rPr>
-              <a:t>Blurb and photo to be inserted</a:t>
-            </a:r>
-            <a:endParaRPr lang="en-US" sz="1600" b="1" dirty="0">
-              <a:latin typeface="Arial" panose="020B0604020202020204" pitchFamily="34" charset="0"/>
-              <a:cs typeface="Arial" panose="020B0604020202020204" pitchFamily="34" charset="0"/>
-            </a:endParaRPr>
-          </a:p>
-          <a:p>
-            <a:endParaRPr lang="en-US" sz="1600" b="1" dirty="0">
-              <a:latin typeface="Arial" panose="020B0604020202020204" pitchFamily="34" charset="0"/>
-              <a:cs typeface="Arial" panose="020B0604020202020204" pitchFamily="34" charset="0"/>
-            </a:endParaRPr>
-          </a:p>
-          <a:p>
-            <a:endParaRPr lang="en-US" sz="1600" b="1" dirty="0">
-              <a:latin typeface="Arial" panose="020B0604020202020204" pitchFamily="34" charset="0"/>
-              <a:cs typeface="Arial" panose="020B0604020202020204" pitchFamily="34" charset="0"/>
-            </a:endParaRPr>
-          </a:p>
-          <a:p>
-            <a:r>
-              <a:rPr lang="en-US" sz="1600" b="1" dirty="0">
-                <a:latin typeface="Arial" panose="020B0604020202020204" pitchFamily="34" charset="0"/>
-                <a:cs typeface="Arial" panose="020B0604020202020204" pitchFamily="34" charset="0"/>
-              </a:rPr>
-              <a:t>Until</a:t>
-            </a:r>
-          </a:p>
-          <a:p>
-            <a:endParaRPr lang="en-US" sz="1600" b="1" dirty="0">
-              <a:latin typeface="Arial" panose="020B0604020202020204" pitchFamily="34" charset="0"/>
-              <a:cs typeface="Arial" panose="020B0604020202020204" pitchFamily="34" charset="0"/>
-            </a:endParaRPr>
-          </a:p>
-          <a:p>
-            <a:r>
-              <a:rPr lang="en-US" sz="1600" i="1" dirty="0">
-                <a:latin typeface="Arial" panose="020B0604020202020204" pitchFamily="34" charset="0"/>
-                <a:cs typeface="Arial" panose="020B0604020202020204" pitchFamily="34" charset="0"/>
-              </a:rPr>
-              <a:t>Blurb and photo to be inserted</a:t>
-            </a:r>
-            <a:endParaRPr lang="en-US" sz="1600" b="1" dirty="0">
-              <a:latin typeface="Arial" panose="020B0604020202020204" pitchFamily="34" charset="0"/>
-              <a:cs typeface="Arial" panose="020B0604020202020204" pitchFamily="34" charset="0"/>
-            </a:endParaRPr>
-          </a:p>
-          <a:p>
-            <a:endParaRPr lang="en-US" sz="1600" b="1" dirty="0">
-              <a:latin typeface="Arial" panose="020B0604020202020204" pitchFamily="34" charset="0"/>
-              <a:cs typeface="Arial" panose="020B0604020202020204" pitchFamily="34" charset="0"/>
-            </a:endParaRPr>
-          </a:p>
-          <a:p>
-            <a:pPr algn="ctr"/>
-            <a:endParaRPr lang="en-US" sz="1600" b="1" dirty="0">
-              <a:latin typeface="Arial" panose="020B0604020202020204" pitchFamily="34" charset="0"/>
-              <a:cs typeface="Arial" panose="020B0604020202020204" pitchFamily="34" charset="0"/>
-            </a:endParaRPr>
-          </a:p>
-          <a:p>
-            <a:pPr algn="ctr"/>
-            <a:endParaRPr lang="en-US" sz="1600" b="1" dirty="0">
-              <a:latin typeface="Arial" panose="020B0604020202020204" pitchFamily="34" charset="0"/>
-              <a:cs typeface="Arial" panose="020B0604020202020204" pitchFamily="34" charset="0"/>
-            </a:endParaRPr>
-          </a:p>
-          <a:p>
             <a:endParaRPr lang="en-US" sz="1600" dirty="0">
               <a:latin typeface="Arial" panose="020B0604020202020204" pitchFamily="34" charset="0"/>
               <a:cs typeface="Arial" panose="020B0604020202020204" pitchFamily="34" charset="0"/>
@@ -4579,14 +4538,12 @@
           </a:p>
           <a:p>
             <a:r>
-              <a:rPr lang="en-US" sz="1600" b="1" dirty="0">
+              <a:rPr lang="en-US" sz="2400" b="1" dirty="0">
                 <a:latin typeface="Arial" panose="020B0604020202020204" pitchFamily="34" charset="0"/>
                 <a:cs typeface="Arial" panose="020B0604020202020204" pitchFamily="34" charset="0"/>
               </a:rPr>
               <a:t>Unless</a:t>
             </a:r>
-          </a:p>
-          <a:p>
             <a:endParaRPr lang="en-US" sz="1600" dirty="0">
               <a:latin typeface="Arial" panose="020B0604020202020204" pitchFamily="34" charset="0"/>
               <a:cs typeface="Arial" panose="020B0604020202020204" pitchFamily="34" charset="0"/>
@@ -4594,18 +4551,39 @@
           </a:p>
           <a:p>
             <a:r>
-              <a:rPr lang="en-US" sz="1600" i="1" dirty="0">
-                <a:latin typeface="Arial" panose="020B0604020202020204" pitchFamily="34" charset="0"/>
-                <a:cs typeface="Arial" panose="020B0604020202020204" pitchFamily="34" charset="0"/>
-              </a:rPr>
-              <a:t>Blurb and photo to be inserted</a:t>
-            </a:r>
-            <a:endParaRPr lang="en-US" sz="1600" b="1" dirty="0">
-              <a:latin typeface="Arial" panose="020B0604020202020204" pitchFamily="34" charset="0"/>
-              <a:cs typeface="Arial" panose="020B0604020202020204" pitchFamily="34" charset="0"/>
-            </a:endParaRPr>
-          </a:p>
-          <a:p>
+              <a:rPr lang="en-US" sz="2200" i="1" dirty="0">
+                <a:latin typeface="Arial" panose="020B0604020202020204" pitchFamily="34" charset="0"/>
+                <a:cs typeface="Arial" panose="020B0604020202020204" pitchFamily="34" charset="0"/>
+              </a:rPr>
+              <a:t>The unless expression is the</a:t>
+            </a:r>
+          </a:p>
+          <a:p>
+            <a:r>
+              <a:rPr lang="en-US" sz="2200" i="1" dirty="0">
+                <a:latin typeface="Arial" panose="020B0604020202020204" pitchFamily="34" charset="0"/>
+                <a:cs typeface="Arial" panose="020B0604020202020204" pitchFamily="34" charset="0"/>
+              </a:rPr>
+              <a:t>opposite of the if expression.</a:t>
+            </a:r>
+          </a:p>
+          <a:p>
+            <a:r>
+              <a:rPr lang="en-US" sz="2200" i="1" dirty="0">
+                <a:latin typeface="Arial" panose="020B0604020202020204" pitchFamily="34" charset="0"/>
+                <a:cs typeface="Arial" panose="020B0604020202020204" pitchFamily="34" charset="0"/>
+              </a:rPr>
+              <a:t>If the value is false the “else“</a:t>
+            </a:r>
+          </a:p>
+          <a:p>
+            <a:r>
+              <a:rPr lang="en-US" sz="2200" i="1" dirty="0">
+                <a:latin typeface="Arial" panose="020B0604020202020204" pitchFamily="34" charset="0"/>
+                <a:cs typeface="Arial" panose="020B0604020202020204" pitchFamily="34" charset="0"/>
+              </a:rPr>
+              <a:t>expression is executed </a:t>
+            </a:r>
             <a:endParaRPr lang="en-US" sz="1600" dirty="0">
               <a:latin typeface="Arial" panose="020B0604020202020204" pitchFamily="34" charset="0"/>
               <a:cs typeface="Arial" panose="020B0604020202020204" pitchFamily="34" charset="0"/>
@@ -4642,6 +4620,27 @@
             </a:endParaRPr>
           </a:p>
           <a:p>
+            <a:r>
+              <a:rPr lang="en-CA" sz="2400" dirty="0">
+                <a:latin typeface="Arial" panose="020B0604020202020204" pitchFamily="34" charset="0"/>
+                <a:cs typeface="Arial" panose="020B0604020202020204" pitchFamily="34" charset="0"/>
+              </a:rPr>
+              <a:t>The most challenging part of this project was the size and complexity of the code. It was very challenging at first to find what we were looking for and understand how everything in the </a:t>
+            </a:r>
+            <a:r>
+              <a:rPr lang="en-CA" sz="2400" dirty="0" err="1">
+                <a:latin typeface="Arial" panose="020B0604020202020204" pitchFamily="34" charset="0"/>
+                <a:cs typeface="Arial" panose="020B0604020202020204" pitchFamily="34" charset="0"/>
+              </a:rPr>
+              <a:t>CPython</a:t>
+            </a:r>
+            <a:r>
+              <a:rPr lang="en-CA" sz="2400" dirty="0">
+                <a:latin typeface="Arial" panose="020B0604020202020204" pitchFamily="34" charset="0"/>
+                <a:cs typeface="Arial" panose="020B0604020202020204" pitchFamily="34" charset="0"/>
+              </a:rPr>
+              <a:t> compiler was connected. This was further magnified by the out of date documentation and heavy use of macros. In hindsight, we didn’t have to write too many lines of code and it was truly a situation of quality over quantity. If we were to do this project again, we would definitely try to implement some compiler optimizations like constant folding. Looking forward, we would love to try and implement some of existing PEP’s, most notably PEP 3124 - Overloading, Generic Functions, Interfaces, and Adaptation.</a:t>
+            </a:r>
             <a:endParaRPr lang="en-US" sz="1600" dirty="0">
               <a:latin typeface="Arial" panose="020B0604020202020204" pitchFamily="34" charset="0"/>
               <a:cs typeface="Arial" panose="020B0604020202020204" pitchFamily="34" charset="0"/>
@@ -4654,40 +4653,7 @@
             </a:endParaRPr>
           </a:p>
           <a:p>
-            <a:r>
-              <a:rPr lang="en-CA" sz="2400" dirty="0">
-                <a:latin typeface="Arial" panose="020B0604020202020204" pitchFamily="34" charset="0"/>
-                <a:cs typeface="Arial" panose="020B0604020202020204" pitchFamily="34" charset="0"/>
-              </a:rPr>
-              <a:t>The most challenging part of this project was the size and complexity of the code. It was very challenging at first to find what we were looking for and understand how everything in the </a:t>
-            </a:r>
-            <a:r>
-              <a:rPr lang="en-CA" sz="2400" dirty="0" err="1">
-                <a:latin typeface="Arial" panose="020B0604020202020204" pitchFamily="34" charset="0"/>
-                <a:cs typeface="Arial" panose="020B0604020202020204" pitchFamily="34" charset="0"/>
-              </a:rPr>
-              <a:t>CPython</a:t>
-            </a:r>
-            <a:r>
-              <a:rPr lang="en-CA" sz="2400" dirty="0">
-                <a:latin typeface="Arial" panose="020B0604020202020204" pitchFamily="34" charset="0"/>
-                <a:cs typeface="Arial" panose="020B0604020202020204" pitchFamily="34" charset="0"/>
-              </a:rPr>
-              <a:t> compiler was connected. This was further magnified by the out of date documentation and heavy use of macros. In hindsight, we didn’t have to write too many lines of code and it was truly a situation of quality over quantity. If we were to do this project again, we would definitely try to implement some compiler optimizations like constant folding. Looking forward, we would love to try and implement some of existing PEP’s, most notably PEP 3124 - Overloading, Generic Functions, Interfaces, and Adaptation.</a:t>
-            </a:r>
-            <a:endParaRPr lang="en-US" sz="1600" dirty="0">
-              <a:latin typeface="Arial" panose="020B0604020202020204" pitchFamily="34" charset="0"/>
-              <a:cs typeface="Arial" panose="020B0604020202020204" pitchFamily="34" charset="0"/>
-            </a:endParaRPr>
-          </a:p>
-          <a:p>
-            <a:endParaRPr lang="en-US" sz="1600" dirty="0">
-              <a:latin typeface="Arial" panose="020B0604020202020204" pitchFamily="34" charset="0"/>
-              <a:cs typeface="Arial" panose="020B0604020202020204" pitchFamily="34" charset="0"/>
-            </a:endParaRPr>
-          </a:p>
-          <a:p>
-            <a:endParaRPr lang="en-US" sz="1600" dirty="0">
+            <a:endParaRPr lang="en-US" sz="1400" baseline="30000" dirty="0">
               <a:latin typeface="Arial" panose="020B0604020202020204" pitchFamily="34" charset="0"/>
               <a:cs typeface="Arial" panose="020B0604020202020204" pitchFamily="34" charset="0"/>
             </a:endParaRPr>
@@ -5677,11 +5643,18 @@
           </a:p>
           <a:p>
             <a:r>
+              <a:rPr lang="en-US" sz="2400">
+                <a:latin typeface="Arial" panose="020B0604020202020204" pitchFamily="34" charset="0"/>
+                <a:cs typeface="Arial" panose="020B0604020202020204" pitchFamily="34" charset="0"/>
+              </a:rPr>
+              <a:t>Python </a:t>
+            </a:r>
+            <a:r>
               <a:rPr lang="en-US" sz="2400" dirty="0">
                 <a:latin typeface="Arial" panose="020B0604020202020204" pitchFamily="34" charset="0"/>
                 <a:cs typeface="Arial" panose="020B0604020202020204" pitchFamily="34" charset="0"/>
               </a:rPr>
-              <a:t>One of the most beloved programming languages out there is Python. It contains a plethora of syntax that enables its users to achieve their goals.  </a:t>
+              <a:t>is one of the most beloved programming languages. It contains a plethora of syntax that enables its users to achieve their goals.  </a:t>
             </a:r>
           </a:p>
           <a:p>
@@ -5755,7 +5728,7 @@
                 <a:ea typeface="+mn-ea"/>
                 <a:cs typeface="Arial" panose="020B0604020202020204" pitchFamily="34" charset="0"/>
               </a:rPr>
-              <a:t>In order to alter Python, we took advantage of the  CPython compiler (V 3.7) which has multiple components for compilation which include the following steps</a:t>
+              <a:t>In order to alter Python, we took advantage of the  CPython compiler (V 3.7) which executes the following steps</a:t>
             </a:r>
             <a:r>
               <a:rPr lang="en-US" sz="2400" baseline="30000" dirty="0">
@@ -5931,12 +5904,35 @@
               <a:buChar char="•"/>
             </a:pPr>
             <a:r>
+              <a:rPr lang="en-US" sz="2200" dirty="0" err="1">
+                <a:latin typeface="Arial" panose="020B0604020202020204" pitchFamily="34" charset="0"/>
+                <a:ea typeface="+mn-ea"/>
+                <a:cs typeface="Arial" panose="020B0604020202020204" pitchFamily="34" charset="0"/>
+              </a:rPr>
+              <a:t>Python.asdl</a:t>
+            </a:r>
+            <a:r>
               <a:rPr lang="en-US" sz="2200" dirty="0">
                 <a:latin typeface="Arial" panose="020B0604020202020204" pitchFamily="34" charset="0"/>
                 <a:ea typeface="+mn-ea"/>
                 <a:cs typeface="Arial" panose="020B0604020202020204" pitchFamily="34" charset="0"/>
               </a:rPr>
-              <a:t>Python.asdl -&gt; Used for parsing into AST</a:t>
+              <a:t> </a:t>
+            </a:r>
+            <a:r>
+              <a:rPr lang="en-CA" sz="2200" dirty="0">
+                <a:latin typeface="Arial" panose="020B0604020202020204" pitchFamily="34" charset="0"/>
+                <a:cs typeface="Arial" panose="020B0604020202020204" pitchFamily="34" charset="0"/>
+              </a:rPr>
+              <a:t>→ </a:t>
+            </a:r>
+            <a:r>
+              <a:rPr lang="en-US" sz="2200" dirty="0">
+                <a:latin typeface="Arial" panose="020B0604020202020204" pitchFamily="34" charset="0"/>
+                <a:ea typeface="+mn-ea"/>
+                <a:cs typeface="Arial" panose="020B0604020202020204" pitchFamily="34" charset="0"/>
+              </a:rPr>
+              <a:t>Used for parsing into AST</a:t>
             </a:r>
           </a:p>
           <a:p>
@@ -5950,7 +5946,22 @@
                 <a:ea typeface="+mn-ea"/>
                 <a:cs typeface="Arial" panose="020B0604020202020204" pitchFamily="34" charset="0"/>
               </a:rPr>
-              <a:t>Grammar -&gt; Contains grammar rules</a:t>
+              <a:t>Grammar </a:t>
+            </a:r>
+            <a:r>
+              <a:rPr lang="en-CA" sz="2200" dirty="0">
+                <a:latin typeface="Arial" panose="020B0604020202020204" pitchFamily="34" charset="0"/>
+                <a:cs typeface="Arial" panose="020B0604020202020204" pitchFamily="34" charset="0"/>
+              </a:rPr>
+              <a:t>→</a:t>
+            </a:r>
+            <a:r>
+              <a:rPr lang="en-US" sz="2200" dirty="0">
+                <a:latin typeface="Arial" panose="020B0604020202020204" pitchFamily="34" charset="0"/>
+                <a:ea typeface="+mn-ea"/>
+                <a:cs typeface="Arial" panose="020B0604020202020204" pitchFamily="34" charset="0"/>
+              </a:rPr>
+              <a:t> Contains grammar rules</a:t>
             </a:r>
           </a:p>
           <a:p>
@@ -5972,7 +5983,22 @@
                 <a:ea typeface="+mn-ea"/>
                 <a:cs typeface="Arial" panose="020B0604020202020204" pitchFamily="34" charset="0"/>
               </a:rPr>
-              <a:t> -&gt; executes byte-code</a:t>
+              <a:t> </a:t>
+            </a:r>
+            <a:r>
+              <a:rPr lang="en-CA" sz="2200" dirty="0">
+                <a:latin typeface="Arial" panose="020B0604020202020204" pitchFamily="34" charset="0"/>
+                <a:cs typeface="Arial" panose="020B0604020202020204" pitchFamily="34" charset="0"/>
+              </a:rPr>
+              <a:t>→</a:t>
+            </a:r>
+            <a:r>
+              <a:rPr lang="en-US" sz="2200" dirty="0">
+                <a:latin typeface="Arial" panose="020B0604020202020204" pitchFamily="34" charset="0"/>
+                <a:ea typeface="+mn-ea"/>
+                <a:cs typeface="Arial" panose="020B0604020202020204" pitchFamily="34" charset="0"/>
+              </a:rPr>
+              <a:t> executes byte-code</a:t>
             </a:r>
           </a:p>
           <a:p>
@@ -6036,7 +6062,7 @@
                 <a:ea typeface="+mn-ea"/>
                 <a:cs typeface="Arial" panose="020B0604020202020204" pitchFamily="34" charset="0"/>
               </a:rPr>
-              <a:t> regenerated the remaining necessary source code such including </a:t>
+              <a:t> regenerated the remaining necessary source code such as </a:t>
             </a:r>
             <a:r>
               <a:rPr lang="en-US" sz="2400" dirty="0" err="1">
@@ -6052,7 +6078,7 @@
                 <a:ea typeface="+mn-ea"/>
                 <a:cs typeface="Arial" panose="020B0604020202020204" pitchFamily="34" charset="0"/>
               </a:rPr>
-              <a:t>  and </a:t>
+              <a:t> and </a:t>
             </a:r>
             <a:r>
               <a:rPr lang="en-US" sz="2400" dirty="0" err="1">
@@ -6068,7 +6094,7 @@
                 <a:ea typeface="+mn-ea"/>
                 <a:cs typeface="Arial" panose="020B0604020202020204" pitchFamily="34" charset="0"/>
               </a:rPr>
-              <a:t>. </a:t>
+              <a:t>. Finally, we used the “dis” module to verify that the generated bytecode was as expected. </a:t>
             </a:r>
             <a:endParaRPr lang="en-US" sz="1600" b="1" dirty="0">
               <a:latin typeface="Arial" panose="020B0604020202020204" pitchFamily="34" charset="0"/>
@@ -7433,6 +7459,123 @@
           <a:xfrm>
             <a:off x="8809341" y="8409860"/>
             <a:ext cx="7301990" cy="937655"/>
+          </a:xfrm>
+          <a:prstGeom prst="rect">
+            <a:avLst/>
+          </a:prstGeom>
+          <a:ln>
+            <a:noFill/>
+          </a:ln>
+          <a:effectLst>
+            <a:outerShdw blurRad="292100" dist="139700" dir="2700000" algn="tl" rotWithShape="0">
+              <a:srgbClr val="333333">
+                <a:alpha val="65000"/>
+              </a:srgbClr>
+            </a:outerShdw>
+          </a:effectLst>
+        </p:spPr>
+      </p:pic>
+      <p:pic>
+        <p:nvPicPr>
+          <p:cNvPr id="33" name="Picture 32">
+            <a:extLst>
+              <a:ext uri="{FF2B5EF4-FFF2-40B4-BE49-F238E27FC236}">
+                <a16:creationId xmlns:a16="http://schemas.microsoft.com/office/drawing/2014/main" id="{50281144-F53E-4C44-AFE7-800607B6A213}"/>
+              </a:ext>
+            </a:extLst>
+          </p:cNvPr>
+          <p:cNvPicPr/>
+          <p:nvPr/>
+        </p:nvPicPr>
+        <p:blipFill rotWithShape="1">
+          <a:blip r:embed="rId15"/>
+          <a:srcRect r="8715"/>
+          <a:stretch/>
+        </p:blipFill>
+        <p:spPr>
+          <a:xfrm>
+            <a:off x="29440629" y="9719643"/>
+            <a:ext cx="1984053" cy="1730540"/>
+          </a:xfrm>
+          <a:prstGeom prst="rect">
+            <a:avLst/>
+          </a:prstGeom>
+          <a:ln>
+            <a:noFill/>
+          </a:ln>
+          <a:effectLst>
+            <a:outerShdw blurRad="292100" dist="139700" dir="2700000" algn="tl" rotWithShape="0">
+              <a:srgbClr val="333333">
+                <a:alpha val="65000"/>
+              </a:srgbClr>
+            </a:outerShdw>
+          </a:effectLst>
+        </p:spPr>
+      </p:pic>
+      <p:pic>
+        <p:nvPicPr>
+          <p:cNvPr id="4" name="Picture 3">
+            <a:extLst>
+              <a:ext uri="{FF2B5EF4-FFF2-40B4-BE49-F238E27FC236}">
+                <a16:creationId xmlns:a16="http://schemas.microsoft.com/office/drawing/2014/main" id="{49C027D8-A620-4281-B24D-7778078187C0}"/>
+              </a:ext>
+            </a:extLst>
+          </p:cNvPr>
+          <p:cNvPicPr>
+            <a:picLocks noChangeAspect="1"/>
+          </p:cNvPicPr>
+          <p:nvPr/>
+        </p:nvPicPr>
+        <p:blipFill>
+          <a:blip r:embed="rId16"/>
+          <a:stretch>
+            <a:fillRect/>
+          </a:stretch>
+        </p:blipFill>
+        <p:spPr>
+          <a:xfrm>
+            <a:off x="29440629" y="7578296"/>
+            <a:ext cx="1984053" cy="1769219"/>
+          </a:xfrm>
+          <a:prstGeom prst="rect">
+            <a:avLst/>
+          </a:prstGeom>
+          <a:ln>
+            <a:noFill/>
+          </a:ln>
+          <a:effectLst>
+            <a:outerShdw blurRad="292100" dist="139700" dir="2700000" algn="tl" rotWithShape="0">
+              <a:srgbClr val="333333">
+                <a:alpha val="65000"/>
+              </a:srgbClr>
+            </a:outerShdw>
+          </a:effectLst>
+        </p:spPr>
+      </p:pic>
+      <p:pic>
+        <p:nvPicPr>
+          <p:cNvPr id="9" name="Picture 8">
+            <a:extLst>
+              <a:ext uri="{FF2B5EF4-FFF2-40B4-BE49-F238E27FC236}">
+                <a16:creationId xmlns:a16="http://schemas.microsoft.com/office/drawing/2014/main" id="{FE57543B-D03A-4D4E-8197-C7FBDD54D316}"/>
+              </a:ext>
+            </a:extLst>
+          </p:cNvPr>
+          <p:cNvPicPr>
+            <a:picLocks noChangeAspect="1"/>
+          </p:cNvPicPr>
+          <p:nvPr/>
+        </p:nvPicPr>
+        <p:blipFill>
+          <a:blip r:embed="rId17"/>
+          <a:stretch>
+            <a:fillRect/>
+          </a:stretch>
+        </p:blipFill>
+        <p:spPr>
+          <a:xfrm>
+            <a:off x="29630056" y="4971876"/>
+            <a:ext cx="1471701" cy="2292755"/>
           </a:xfrm>
           <a:prstGeom prst="rect">
             <a:avLst/>

</xml_diff>

<commit_message>
Final proof read by Pedro Oliveira
</commit_message>
<xml_diff>
--- a/Doc/Poster/poster.pptx
+++ b/Doc/Poster/poster.pptx
@@ -4278,7 +4278,7 @@
         <p:spPr bwMode="auto">
           <a:xfrm>
             <a:off x="25063253" y="4172431"/>
-            <a:ext cx="7072312" cy="17225214"/>
+            <a:ext cx="7072312" cy="17615064"/>
           </a:xfrm>
           <a:prstGeom prst="rect">
             <a:avLst/>
@@ -4639,8 +4639,10 @@
                 <a:latin typeface="Arial" panose="020B0604020202020204" pitchFamily="34" charset="0"/>
                 <a:cs typeface="Arial" panose="020B0604020202020204" pitchFamily="34" charset="0"/>
               </a:rPr>
-              <a:t> compiler was connected. This was further magnified by the out of date documentation and heavy use of macros. In hindsight, we didn’t have to write too many lines of code and it was truly a situation of quality over quantity. If we were to do this project again, we would definitely try to implement some compiler optimizations like constant folding. Looking forward, we would love to try and implement some of existing PEP’s, most notably PEP 3124 - Overloading, Generic Functions, Interfaces, and Adaptation.</a:t>
-            </a:r>
+              <a:t> compiler was connected. This was further magnified by the out of date documentation and heavy use of macros. In hindsight, we didn’t have to write too many lines of code and it was truly a situation of quality over quantity. If we were to do this project again, we would definitely try to implement some compiler optimizations like constant folding. Looking forward, we would love to try and implement some of existing PEP’s, most notably PEP 204 – Range Literals</a:t>
+            </a:r>
+          </a:p>
+          <a:p>
             <a:endParaRPr lang="en-US" sz="1600" dirty="0">
               <a:latin typeface="Arial" panose="020B0604020202020204" pitchFamily="34" charset="0"/>
               <a:cs typeface="Arial" panose="020B0604020202020204" pitchFamily="34" charset="0"/>
@@ -4648,6 +4650,12 @@
           </a:p>
           <a:p>
             <a:endParaRPr lang="en-US" sz="1600" dirty="0">
+              <a:latin typeface="Arial" panose="020B0604020202020204" pitchFamily="34" charset="0"/>
+              <a:cs typeface="Arial" panose="020B0604020202020204" pitchFamily="34" charset="0"/>
+            </a:endParaRPr>
+          </a:p>
+          <a:p>
+            <a:endParaRPr lang="en-US" sz="1400" baseline="30000" dirty="0">
               <a:latin typeface="Arial" panose="020B0604020202020204" pitchFamily="34" charset="0"/>
               <a:cs typeface="Arial" panose="020B0604020202020204" pitchFamily="34" charset="0"/>
             </a:endParaRPr>
@@ -5643,18 +5651,11 @@
           </a:p>
           <a:p>
             <a:r>
-              <a:rPr lang="en-US" sz="2400">
-                <a:latin typeface="Arial" panose="020B0604020202020204" pitchFamily="34" charset="0"/>
-                <a:cs typeface="Arial" panose="020B0604020202020204" pitchFamily="34" charset="0"/>
-              </a:rPr>
-              <a:t>Python </a:t>
-            </a:r>
-            <a:r>
               <a:rPr lang="en-US" sz="2400" dirty="0">
                 <a:latin typeface="Arial" panose="020B0604020202020204" pitchFamily="34" charset="0"/>
                 <a:cs typeface="Arial" panose="020B0604020202020204" pitchFamily="34" charset="0"/>
               </a:rPr>
-              <a:t>is one of the most beloved programming languages. It contains a plethora of syntax that enables its users to achieve their goals.  </a:t>
+              <a:t>Python is one of the most beloved programming languages. It contains a plethora of syntax that enables its users to achieve their goals.  </a:t>
             </a:r>
           </a:p>
           <a:p>
@@ -5728,7 +5729,7 @@
                 <a:ea typeface="+mn-ea"/>
                 <a:cs typeface="Arial" panose="020B0604020202020204" pitchFamily="34" charset="0"/>
               </a:rPr>
-              <a:t>In order to alter Python, we took advantage of the  CPython compiler (V 3.7) which executes the following steps</a:t>
+              <a:t>In order to alter Python, we took advantage of the  CPython compiler (v3.7) which executes the following steps</a:t>
             </a:r>
             <a:r>
               <a:rPr lang="en-US" sz="2400" baseline="30000" dirty="0">
@@ -6523,7 +6524,7 @@
                 <a:ea typeface="Open Sans" panose="020B0606030504020204" pitchFamily="34" charset="0"/>
                 <a:cs typeface="Arial" panose="020B0604020202020204" pitchFamily="34" charset="0"/>
               </a:rPr>
-              <a:t>By: Zak Ahmed, Pedro Oliveira, Piranaven Selvathayabaran</a:t>
+              <a:t>By: Zakaria Ahmed, Pedro Oliveira, Piranaven Selvathayabaran</a:t>
             </a:r>
           </a:p>
           <a:p>

</xml_diff>